<commit_message>
Node's default page improved design
</commit_message>
<xml_diff>
--- a/documents/DP1.pptx
+++ b/documents/DP1.pptx
@@ -683,6 +683,462 @@
           <a:bodyPr/>
           <a:lstStyle/>
           <a:p>
+            <a:r>
+              <a:rPr lang="en-US" dirty="0" err="1" smtClean="0"/>
+              <a:t>Tuto</a:t>
+            </a:r>
+            <a:r>
+              <a:rPr lang="en-US" baseline="0" dirty="0" smtClean="0"/>
+              <a:t> </a:t>
+            </a:r>
+            <a:r>
+              <a:rPr lang="en-US" baseline="0" dirty="0" err="1" smtClean="0"/>
+              <a:t>temu</a:t>
+            </a:r>
+            <a:r>
+              <a:rPr lang="en-US" baseline="0" dirty="0" smtClean="0"/>
+              <a:t> </a:t>
+            </a:r>
+            <a:r>
+              <a:rPr lang="en-US" baseline="0" dirty="0" err="1" smtClean="0"/>
+              <a:t>som</a:t>
+            </a:r>
+            <a:r>
+              <a:rPr lang="en-US" baseline="0" dirty="0" smtClean="0"/>
+              <a:t> </a:t>
+            </a:r>
+            <a:r>
+              <a:rPr lang="en-US" baseline="0" dirty="0" err="1" smtClean="0"/>
+              <a:t>si</a:t>
+            </a:r>
+            <a:r>
+              <a:rPr lang="en-US" baseline="0" dirty="0" smtClean="0"/>
+              <a:t> </a:t>
+            </a:r>
+            <a:r>
+              <a:rPr lang="en-US" baseline="0" dirty="0" err="1" smtClean="0"/>
+              <a:t>navrhol</a:t>
+            </a:r>
+            <a:r>
+              <a:rPr lang="en-US" baseline="0" dirty="0" smtClean="0"/>
+              <a:t> </a:t>
+            </a:r>
+            <a:r>
+              <a:rPr lang="en-US" baseline="0" dirty="0" err="1" smtClean="0"/>
+              <a:t>preto</a:t>
+            </a:r>
+            <a:r>
+              <a:rPr lang="en-US" baseline="0" dirty="0" smtClean="0"/>
+              <a:t>, </a:t>
+            </a:r>
+            <a:r>
+              <a:rPr lang="en-US" baseline="0" dirty="0" err="1" smtClean="0"/>
+              <a:t>lebo</a:t>
+            </a:r>
+            <a:r>
+              <a:rPr lang="en-US" baseline="0" dirty="0" smtClean="0"/>
+              <a:t> </a:t>
+            </a:r>
+            <a:r>
+              <a:rPr lang="en-US" baseline="0" dirty="0" err="1" smtClean="0"/>
+              <a:t>uz</a:t>
+            </a:r>
+            <a:r>
+              <a:rPr lang="en-US" baseline="0" dirty="0" smtClean="0"/>
+              <a:t> </a:t>
+            </a:r>
+            <a:r>
+              <a:rPr lang="en-US" baseline="0" dirty="0" err="1" smtClean="0"/>
+              <a:t>na</a:t>
+            </a:r>
+            <a:r>
+              <a:rPr lang="en-US" baseline="0" dirty="0" smtClean="0"/>
+              <a:t> </a:t>
+            </a:r>
+            <a:r>
+              <a:rPr lang="en-US" baseline="0" dirty="0" err="1" smtClean="0"/>
+              <a:t>strednej</a:t>
+            </a:r>
+            <a:r>
+              <a:rPr lang="en-US" baseline="0" dirty="0" smtClean="0"/>
+              <a:t> </a:t>
+            </a:r>
+            <a:r>
+              <a:rPr lang="en-US" baseline="0" dirty="0" err="1" smtClean="0"/>
+              <a:t>skole</a:t>
+            </a:r>
+            <a:r>
+              <a:rPr lang="en-US" baseline="0" dirty="0" smtClean="0"/>
+              <a:t> ma </a:t>
+            </a:r>
+            <a:r>
+              <a:rPr lang="en-US" baseline="0" dirty="0" err="1" smtClean="0"/>
+              <a:t>fascinovala</a:t>
+            </a:r>
+            <a:r>
+              <a:rPr lang="en-US" baseline="0" dirty="0" smtClean="0"/>
+              <a:t> </a:t>
+            </a:r>
+            <a:r>
+              <a:rPr lang="en-US" baseline="0" dirty="0" err="1" smtClean="0"/>
+              <a:t>genetika</a:t>
+            </a:r>
+            <a:r>
+              <a:rPr lang="en-US" baseline="0" dirty="0" smtClean="0"/>
+              <a:t> a </a:t>
+            </a:r>
+            <a:r>
+              <a:rPr lang="en-US" baseline="0" dirty="0" err="1" smtClean="0"/>
+              <a:t>chcel</a:t>
+            </a:r>
+            <a:r>
+              <a:rPr lang="en-US" baseline="0" dirty="0" smtClean="0"/>
+              <a:t> </a:t>
+            </a:r>
+            <a:r>
+              <a:rPr lang="en-US" baseline="0" dirty="0" err="1" smtClean="0"/>
+              <a:t>som</a:t>
+            </a:r>
+            <a:r>
+              <a:rPr lang="en-US" baseline="0" dirty="0" smtClean="0"/>
+              <a:t> </a:t>
+            </a:r>
+            <a:r>
+              <a:rPr lang="en-US" baseline="0" dirty="0" err="1" smtClean="0"/>
+              <a:t>sa</a:t>
+            </a:r>
+            <a:r>
+              <a:rPr lang="en-US" baseline="0" dirty="0" smtClean="0"/>
+              <a:t> </a:t>
+            </a:r>
+            <a:r>
+              <a:rPr lang="en-US" baseline="0" dirty="0" err="1" smtClean="0"/>
+              <a:t>jej</a:t>
+            </a:r>
+            <a:r>
+              <a:rPr lang="en-US" baseline="0" dirty="0" smtClean="0"/>
+              <a:t> </a:t>
+            </a:r>
+            <a:r>
+              <a:rPr lang="en-US" baseline="0" dirty="0" err="1" smtClean="0"/>
+              <a:t>hlbsie</a:t>
+            </a:r>
+            <a:r>
+              <a:rPr lang="en-US" baseline="0" dirty="0" smtClean="0"/>
+              <a:t> </a:t>
+            </a:r>
+            <a:r>
+              <a:rPr lang="en-US" baseline="0" dirty="0" err="1" smtClean="0"/>
+              <a:t>venovat</a:t>
+            </a:r>
+            <a:r>
+              <a:rPr lang="en-US" baseline="0" dirty="0" smtClean="0"/>
+              <a:t> no </a:t>
+            </a:r>
+            <a:r>
+              <a:rPr lang="en-US" baseline="0" dirty="0" err="1" smtClean="0"/>
+              <a:t>samozrejme</a:t>
+            </a:r>
+            <a:r>
+              <a:rPr lang="en-US" baseline="0" dirty="0" smtClean="0"/>
+              <a:t> </a:t>
+            </a:r>
+            <a:r>
+              <a:rPr lang="en-US" baseline="0" dirty="0" err="1" smtClean="0"/>
+              <a:t>sa</a:t>
+            </a:r>
+            <a:r>
+              <a:rPr lang="en-US" baseline="0" dirty="0" smtClean="0"/>
+              <a:t> </a:t>
+            </a:r>
+            <a:r>
+              <a:rPr lang="en-US" baseline="0" dirty="0" err="1" smtClean="0"/>
+              <a:t>nenasiel</a:t>
+            </a:r>
+            <a:r>
+              <a:rPr lang="en-US" baseline="0" dirty="0" smtClean="0"/>
+              <a:t> </a:t>
+            </a:r>
+            <a:r>
+              <a:rPr lang="en-US" baseline="0" dirty="0" err="1" smtClean="0"/>
+              <a:t>na</a:t>
+            </a:r>
+            <a:r>
+              <a:rPr lang="en-US" baseline="0" dirty="0" smtClean="0"/>
+              <a:t> to </a:t>
+            </a:r>
+            <a:r>
+              <a:rPr lang="en-US" baseline="0" dirty="0" err="1" smtClean="0"/>
+              <a:t>cas</a:t>
+            </a:r>
+            <a:r>
+              <a:rPr lang="en-US" baseline="0" dirty="0" smtClean="0"/>
+              <a:t>. </a:t>
+            </a:r>
+            <a:r>
+              <a:rPr lang="en-US" baseline="0" dirty="0" err="1" smtClean="0"/>
+              <a:t>Tak</a:t>
+            </a:r>
+            <a:r>
+              <a:rPr lang="en-US" baseline="0" dirty="0" smtClean="0"/>
+              <a:t> </a:t>
+            </a:r>
+            <a:r>
+              <a:rPr lang="en-US" baseline="0" dirty="0" err="1" smtClean="0"/>
+              <a:t>som</a:t>
+            </a:r>
+            <a:r>
+              <a:rPr lang="en-US" baseline="0" dirty="0" smtClean="0"/>
+              <a:t> </a:t>
+            </a:r>
+            <a:r>
+              <a:rPr lang="en-US" baseline="0" dirty="0" err="1" smtClean="0"/>
+              <a:t>si</a:t>
+            </a:r>
+            <a:r>
+              <a:rPr lang="en-US" baseline="0" dirty="0" smtClean="0"/>
+              <a:t> </a:t>
+            </a:r>
+            <a:r>
+              <a:rPr lang="en-US" baseline="0" dirty="0" err="1" smtClean="0"/>
+              <a:t>povedal,ze</a:t>
+            </a:r>
+            <a:r>
+              <a:rPr lang="en-US" baseline="0" dirty="0" smtClean="0"/>
+              <a:t> </a:t>
+            </a:r>
+            <a:r>
+              <a:rPr lang="en-US" baseline="0" dirty="0" err="1" smtClean="0"/>
+              <a:t>diplomova</a:t>
+            </a:r>
+            <a:r>
+              <a:rPr lang="en-US" baseline="0" dirty="0" smtClean="0"/>
+              <a:t> </a:t>
+            </a:r>
+            <a:r>
+              <a:rPr lang="en-US" baseline="0" dirty="0" err="1" smtClean="0"/>
+              <a:t>praca</a:t>
+            </a:r>
+            <a:r>
+              <a:rPr lang="en-US" baseline="0" dirty="0" smtClean="0"/>
+              <a:t> je v </a:t>
+            </a:r>
+            <a:r>
+              <a:rPr lang="en-US" baseline="0" dirty="0" err="1" smtClean="0"/>
+              <a:t>podstate</a:t>
+            </a:r>
+            <a:r>
+              <a:rPr lang="en-US" baseline="0" dirty="0" smtClean="0"/>
+              <a:t> </a:t>
+            </a:r>
+            <a:r>
+              <a:rPr lang="en-US" baseline="0" dirty="0" err="1" smtClean="0"/>
+              <a:t>posledna</a:t>
+            </a:r>
+            <a:r>
+              <a:rPr lang="en-US" baseline="0" dirty="0" smtClean="0"/>
+              <a:t> </a:t>
+            </a:r>
+            <a:r>
+              <a:rPr lang="en-US" baseline="0" dirty="0" err="1" smtClean="0"/>
+              <a:t>moznost</a:t>
+            </a:r>
+            <a:r>
+              <a:rPr lang="en-US" baseline="0" dirty="0" smtClean="0"/>
+              <a:t> </a:t>
+            </a:r>
+            <a:r>
+              <a:rPr lang="en-US" baseline="0" dirty="0" err="1" smtClean="0"/>
+              <a:t>sa</a:t>
+            </a:r>
+            <a:r>
+              <a:rPr lang="en-US" baseline="0" dirty="0" smtClean="0"/>
+              <a:t> </a:t>
+            </a:r>
+            <a:r>
+              <a:rPr lang="en-US" baseline="0" dirty="0" err="1" smtClean="0"/>
+              <a:t>venovat</a:t>
+            </a:r>
+            <a:r>
+              <a:rPr lang="en-US" baseline="0" dirty="0" smtClean="0"/>
+              <a:t> </a:t>
+            </a:r>
+            <a:r>
+              <a:rPr lang="en-US" baseline="0" dirty="0" err="1" smtClean="0"/>
+              <a:t>tejto</a:t>
+            </a:r>
+            <a:r>
+              <a:rPr lang="en-US" baseline="0" dirty="0" smtClean="0"/>
+              <a:t> </a:t>
+            </a:r>
+            <a:r>
+              <a:rPr lang="en-US" baseline="0" dirty="0" err="1" smtClean="0"/>
+              <a:t>vedeckej</a:t>
+            </a:r>
+            <a:r>
+              <a:rPr lang="en-US" baseline="0" dirty="0" smtClean="0"/>
+              <a:t> </a:t>
+            </a:r>
+            <a:r>
+              <a:rPr lang="en-US" baseline="0" dirty="0" err="1" smtClean="0"/>
+              <a:t>oblasti</a:t>
+            </a:r>
+            <a:r>
+              <a:rPr lang="en-US" baseline="0" dirty="0" smtClean="0"/>
+              <a:t>, ale </a:t>
+            </a:r>
+            <a:r>
+              <a:rPr lang="en-US" baseline="0" dirty="0" err="1" smtClean="0"/>
+              <a:t>taktiez</a:t>
+            </a:r>
+            <a:r>
+              <a:rPr lang="en-US" baseline="0" dirty="0" smtClean="0"/>
+              <a:t> </a:t>
+            </a:r>
+            <a:r>
+              <a:rPr lang="en-US" baseline="0" dirty="0" err="1" smtClean="0"/>
+              <a:t>som</a:t>
+            </a:r>
+            <a:r>
+              <a:rPr lang="en-US" baseline="0" dirty="0" smtClean="0"/>
+              <a:t> </a:t>
+            </a:r>
+            <a:r>
+              <a:rPr lang="en-US" baseline="0" dirty="0" err="1" smtClean="0"/>
+              <a:t>chcel</a:t>
+            </a:r>
+            <a:r>
+              <a:rPr lang="en-US" baseline="0" dirty="0" smtClean="0"/>
+              <a:t> </a:t>
+            </a:r>
+            <a:r>
+              <a:rPr lang="en-US" baseline="0" dirty="0" err="1" smtClean="0"/>
+              <a:t>aby</a:t>
+            </a:r>
+            <a:r>
+              <a:rPr lang="en-US" baseline="0" dirty="0" smtClean="0"/>
+              <a:t> </a:t>
+            </a:r>
+            <a:r>
+              <a:rPr lang="en-US" baseline="0" dirty="0" err="1" smtClean="0"/>
+              <a:t>praca</a:t>
+            </a:r>
+            <a:r>
+              <a:rPr lang="en-US" baseline="0" dirty="0" smtClean="0"/>
+              <a:t> mala </a:t>
+            </a:r>
+            <a:r>
+              <a:rPr lang="en-US" baseline="0" dirty="0" err="1" smtClean="0"/>
+              <a:t>aj</a:t>
+            </a:r>
+            <a:r>
+              <a:rPr lang="en-US" baseline="0" dirty="0" smtClean="0"/>
+              <a:t> </a:t>
+            </a:r>
+            <a:r>
+              <a:rPr lang="en-US" baseline="0" dirty="0" err="1" smtClean="0"/>
+              <a:t>nejaky</a:t>
+            </a:r>
+            <a:r>
+              <a:rPr lang="en-US" baseline="0" dirty="0" smtClean="0"/>
+              <a:t> </a:t>
+            </a:r>
+            <a:r>
+              <a:rPr lang="en-US" baseline="0" dirty="0" err="1" smtClean="0"/>
+              <a:t>aplikacny</a:t>
+            </a:r>
+            <a:r>
+              <a:rPr lang="en-US" baseline="0" dirty="0" smtClean="0"/>
+              <a:t> </a:t>
+            </a:r>
+            <a:r>
+              <a:rPr lang="en-US" baseline="0" dirty="0" err="1" smtClean="0"/>
+              <a:t>vystup</a:t>
+            </a:r>
+            <a:r>
+              <a:rPr lang="en-US" baseline="0" dirty="0" smtClean="0"/>
+              <a:t> a </a:t>
+            </a:r>
+            <a:r>
+              <a:rPr lang="en-US" baseline="0" dirty="0" err="1" smtClean="0"/>
+              <a:t>teda</a:t>
+            </a:r>
+            <a:r>
+              <a:rPr lang="en-US" baseline="0" dirty="0" smtClean="0"/>
+              <a:t> </a:t>
+            </a:r>
+            <a:r>
+              <a:rPr lang="en-US" baseline="0" dirty="0" err="1" smtClean="0"/>
+              <a:t>som</a:t>
+            </a:r>
+            <a:r>
+              <a:rPr lang="en-US" baseline="0" dirty="0" smtClean="0"/>
+              <a:t> </a:t>
+            </a:r>
+            <a:r>
+              <a:rPr lang="en-US" baseline="0" dirty="0" err="1" smtClean="0"/>
+              <a:t>sa</a:t>
+            </a:r>
+            <a:r>
+              <a:rPr lang="en-US" baseline="0" dirty="0" smtClean="0"/>
+              <a:t> </a:t>
+            </a:r>
+            <a:r>
+              <a:rPr lang="en-US" baseline="0" dirty="0" err="1" smtClean="0"/>
+              <a:t>rozhodol</a:t>
+            </a:r>
+            <a:r>
+              <a:rPr lang="en-US" baseline="0" dirty="0" smtClean="0"/>
+              <a:t> </a:t>
+            </a:r>
+            <a:r>
+              <a:rPr lang="en-US" baseline="0" dirty="0" err="1" smtClean="0"/>
+              <a:t>vytvorit</a:t>
+            </a:r>
+            <a:r>
+              <a:rPr lang="en-US" baseline="0" dirty="0" smtClean="0"/>
+              <a:t> </a:t>
+            </a:r>
+            <a:r>
+              <a:rPr lang="en-US" baseline="0" dirty="0" err="1" smtClean="0"/>
+              <a:t>distributivny</a:t>
+            </a:r>
+            <a:r>
+              <a:rPr lang="en-US" baseline="0" dirty="0" smtClean="0"/>
+              <a:t> system </a:t>
+            </a:r>
+            <a:r>
+              <a:rPr lang="en-US" baseline="0" dirty="0" err="1" smtClean="0"/>
+              <a:t>postaveny</a:t>
+            </a:r>
+            <a:r>
+              <a:rPr lang="en-US" baseline="0" dirty="0" smtClean="0"/>
+              <a:t> </a:t>
+            </a:r>
+            <a:r>
+              <a:rPr lang="en-US" baseline="0" dirty="0" err="1" smtClean="0"/>
+              <a:t>na</a:t>
+            </a:r>
+            <a:r>
+              <a:rPr lang="en-US" baseline="0" dirty="0" smtClean="0"/>
+              <a:t> </a:t>
+            </a:r>
+            <a:r>
+              <a:rPr lang="en-US" baseline="0" dirty="0" err="1" smtClean="0"/>
+              <a:t>webovych</a:t>
+            </a:r>
+            <a:r>
+              <a:rPr lang="en-US" baseline="0" dirty="0" smtClean="0"/>
+              <a:t> </a:t>
+            </a:r>
+            <a:r>
+              <a:rPr lang="en-US" baseline="0" dirty="0" err="1" smtClean="0"/>
+              <a:t>technologiach</a:t>
+            </a:r>
+            <a:r>
+              <a:rPr lang="en-US" baseline="0" dirty="0" smtClean="0"/>
+              <a:t>.</a:t>
+            </a:r>
             <a:endParaRPr lang="en-US" dirty="0"/>
           </a:p>
         </p:txBody>
@@ -768,20 +1224,140 @@
           <a:lstStyle/>
           <a:p>
             <a:r>
+              <a:rPr lang="en-US" dirty="0" err="1" smtClean="0"/>
+              <a:t>Genetika</a:t>
+            </a:r>
+            <a:r>
               <a:rPr lang="en-US" dirty="0" smtClean="0"/>
-              <a:t>Gen=</a:t>
-            </a:r>
-            <a:r>
-              <a:rPr lang="en-US" baseline="0" dirty="0" err="1" smtClean="0"/>
-              <a:t>kazda</a:t>
-            </a:r>
-            <a:r>
-              <a:rPr lang="en-US" baseline="0" dirty="0" smtClean="0"/>
-              <a:t> </a:t>
-            </a:r>
-            <a:r>
-              <a:rPr lang="en-US" baseline="0" dirty="0" err="1" smtClean="0"/>
-              <a:t>vlastnost</a:t>
+              <a:t> a </a:t>
+            </a:r>
+            <a:r>
+              <a:rPr lang="en-US" dirty="0" err="1" smtClean="0"/>
+              <a:t>geneticke</a:t>
+            </a:r>
+            <a:r>
+              <a:rPr lang="en-US" dirty="0" smtClean="0"/>
+              <a:t> </a:t>
+            </a:r>
+            <a:r>
+              <a:rPr lang="en-US" dirty="0" err="1" smtClean="0"/>
+              <a:t>ochorenia</a:t>
+            </a:r>
+            <a:r>
+              <a:rPr lang="en-US" dirty="0" smtClean="0"/>
+              <a:t> </a:t>
+            </a:r>
+            <a:r>
+              <a:rPr lang="en-US" dirty="0" err="1" smtClean="0"/>
+              <a:t>su</a:t>
+            </a:r>
+            <a:r>
+              <a:rPr lang="en-US" dirty="0" smtClean="0"/>
+              <a:t> </a:t>
+            </a:r>
+            <a:r>
+              <a:rPr lang="en-US" dirty="0" err="1" smtClean="0"/>
+              <a:t>sucastou</a:t>
+            </a:r>
+            <a:r>
+              <a:rPr lang="en-US" dirty="0" smtClean="0"/>
+              <a:t> </a:t>
+            </a:r>
+            <a:r>
+              <a:rPr lang="en-US" dirty="0" err="1" smtClean="0"/>
+              <a:t>kazdodenneho</a:t>
+            </a:r>
+            <a:r>
+              <a:rPr lang="en-US" dirty="0" smtClean="0"/>
+              <a:t> </a:t>
+            </a:r>
+            <a:r>
+              <a:rPr lang="en-US" dirty="0" err="1" smtClean="0"/>
+              <a:t>zivota</a:t>
+            </a:r>
+            <a:r>
+              <a:rPr lang="en-US" dirty="0" smtClean="0"/>
+              <a:t>,</a:t>
+            </a:r>
+            <a:r>
+              <a:rPr lang="en-US" baseline="0" dirty="0" smtClean="0"/>
+              <a:t> je </a:t>
+            </a:r>
+            <a:r>
+              <a:rPr lang="en-US" baseline="0" dirty="0" err="1" smtClean="0"/>
+              <a:t>zdokumentovanych</a:t>
+            </a:r>
+            <a:r>
+              <a:rPr lang="en-US" baseline="0" dirty="0" smtClean="0"/>
+              <a:t> </a:t>
+            </a:r>
+            <a:r>
+              <a:rPr lang="en-US" baseline="0" dirty="0" err="1" smtClean="0"/>
+              <a:t>cca</a:t>
+            </a:r>
+            <a:r>
+              <a:rPr lang="en-US" baseline="0" dirty="0" smtClean="0"/>
+              <a:t> 6000 </a:t>
+            </a:r>
+            <a:r>
+              <a:rPr lang="en-US" baseline="0" dirty="0" err="1" smtClean="0"/>
+              <a:t>genetickych</a:t>
+            </a:r>
+            <a:r>
+              <a:rPr lang="en-US" baseline="0" dirty="0" smtClean="0"/>
+              <a:t> </a:t>
+            </a:r>
+            <a:r>
+              <a:rPr lang="en-US" baseline="0" dirty="0" err="1" smtClean="0"/>
+              <a:t>poruch</a:t>
+            </a:r>
+            <a:r>
+              <a:rPr lang="en-US" baseline="0" dirty="0" smtClean="0"/>
+              <a:t> a </a:t>
+            </a:r>
+            <a:r>
+              <a:rPr lang="en-US" baseline="0" dirty="0" err="1" smtClean="0"/>
+              <a:t>ochoreni</a:t>
+            </a:r>
+            <a:r>
+              <a:rPr lang="en-US" baseline="0" dirty="0" smtClean="0"/>
+              <a:t> s </a:t>
+            </a:r>
+            <a:r>
+              <a:rPr lang="en-US" baseline="0" dirty="0" err="1" smtClean="0"/>
+              <a:t>vacsimi</a:t>
+            </a:r>
+            <a:r>
+              <a:rPr lang="en-US" baseline="0" dirty="0" smtClean="0"/>
+              <a:t> a </a:t>
+            </a:r>
+            <a:r>
+              <a:rPr lang="en-US" baseline="0" dirty="0" err="1" smtClean="0"/>
+              <a:t>mensimi</a:t>
+            </a:r>
+            <a:r>
+              <a:rPr lang="en-US" baseline="0" dirty="0" smtClean="0"/>
+              <a:t> </a:t>
+            </a:r>
+            <a:r>
+              <a:rPr lang="en-US" baseline="0" dirty="0" err="1" smtClean="0"/>
+              <a:t>nasledkami</a:t>
+            </a:r>
+            <a:r>
+              <a:rPr lang="en-US" baseline="0" dirty="0" smtClean="0"/>
+              <a:t> </a:t>
+            </a:r>
+            <a:r>
+              <a:rPr lang="en-US" baseline="0" dirty="0" err="1" smtClean="0"/>
+              <a:t>na</a:t>
+            </a:r>
+            <a:r>
+              <a:rPr lang="en-US" baseline="0" dirty="0" smtClean="0"/>
+              <a:t> </a:t>
+            </a:r>
+            <a:r>
+              <a:rPr lang="en-US" baseline="0" dirty="0" err="1" smtClean="0"/>
+              <a:t>zivot</a:t>
             </a:r>
             <a:r>
               <a:rPr lang="en-US" baseline="0" dirty="0" smtClean="0"/>
@@ -793,19 +1369,19 @@
             </a:r>
             <a:r>
               <a:rPr lang="en-US" baseline="0" dirty="0" smtClean="0"/>
-              <a:t> (</a:t>
-            </a:r>
-            <a:r>
-              <a:rPr lang="en-US" baseline="0" dirty="0" err="1" smtClean="0"/>
-              <a:t>farba</a:t>
-            </a:r>
-            <a:r>
-              <a:rPr lang="en-US" baseline="0" dirty="0" smtClean="0"/>
-              <a:t> </a:t>
-            </a:r>
-            <a:r>
-              <a:rPr lang="en-US" baseline="0" dirty="0" err="1" smtClean="0"/>
-              <a:t>oči</a:t>
+              <a:t>. </a:t>
+            </a:r>
+            <a:r>
+              <a:rPr lang="en-US" baseline="0" dirty="0" err="1" smtClean="0"/>
+              <a:t>Podla</a:t>
+            </a:r>
+            <a:r>
+              <a:rPr lang="en-US" baseline="0" dirty="0" smtClean="0"/>
+              <a:t> </a:t>
+            </a:r>
+            <a:r>
+              <a:rPr lang="en-US" baseline="0" dirty="0" err="1" smtClean="0"/>
+              <a:t>statistik</a:t>
             </a:r>
             <a:r>
               <a:rPr lang="en-US" baseline="0" dirty="0" smtClean="0"/>
@@ -813,177 +1389,31 @@
             </a:r>
             <a:r>
               <a:rPr lang="en-US" baseline="0" dirty="0" err="1" smtClean="0"/>
-              <a:t>pocet</a:t>
-            </a:r>
-            <a:r>
-              <a:rPr lang="en-US" baseline="0" dirty="0" smtClean="0"/>
-              <a:t> </a:t>
-            </a:r>
-            <a:r>
-              <a:rPr lang="en-US" baseline="0" dirty="0" err="1" smtClean="0"/>
-              <a:t>ruk</a:t>
-            </a:r>
-            <a:r>
-              <a:rPr lang="en-US" baseline="0" dirty="0" smtClean="0"/>
-              <a:t>, </a:t>
-            </a:r>
-            <a:r>
-              <a:rPr lang="en-US" baseline="0" dirty="0" err="1" smtClean="0"/>
-              <a:t>tvorba</a:t>
-            </a:r>
-            <a:r>
-              <a:rPr lang="en-US" baseline="0" dirty="0" smtClean="0"/>
-              <a:t> </a:t>
-            </a:r>
-            <a:r>
-              <a:rPr lang="en-US" baseline="0" dirty="0" err="1" smtClean="0"/>
-              <a:t>bielych</a:t>
-            </a:r>
-            <a:r>
-              <a:rPr lang="en-US" baseline="0" dirty="0" smtClean="0"/>
-              <a:t> </a:t>
-            </a:r>
-            <a:r>
-              <a:rPr lang="en-US" baseline="0" dirty="0" err="1" smtClean="0"/>
-              <a:t>krviniek</a:t>
-            </a:r>
-            <a:r>
-              <a:rPr lang="en-US" baseline="0" dirty="0" smtClean="0"/>
-              <a:t> </a:t>
-            </a:r>
-            <a:r>
-              <a:rPr lang="en-US" baseline="0" dirty="0" err="1" smtClean="0"/>
-              <a:t>atd</a:t>
-            </a:r>
-            <a:r>
-              <a:rPr lang="en-US" baseline="0" dirty="0" smtClean="0"/>
-              <a:t> </a:t>
-            </a:r>
-            <a:r>
-              <a:rPr lang="en-US" baseline="0" dirty="0" err="1" smtClean="0"/>
-              <a:t>atd</a:t>
-            </a:r>
-            <a:r>
-              <a:rPr lang="en-US" baseline="0" dirty="0" smtClean="0"/>
-              <a:t>)</a:t>
-            </a:r>
-          </a:p>
-          <a:p>
-            <a:r>
-              <a:rPr lang="en-US" baseline="0" dirty="0" err="1" smtClean="0"/>
-              <a:t>Mutacia</a:t>
-            </a:r>
-            <a:r>
-              <a:rPr lang="en-US" baseline="0" dirty="0" smtClean="0"/>
-              <a:t> = </a:t>
-            </a:r>
-            <a:r>
-              <a:rPr lang="en-US" baseline="0" dirty="0" err="1" smtClean="0"/>
-              <a:t>zmena</a:t>
-            </a:r>
-            <a:r>
-              <a:rPr lang="en-US" baseline="0" dirty="0" smtClean="0"/>
-              <a:t> 1 </a:t>
-            </a:r>
-            <a:r>
-              <a:rPr lang="en-US" baseline="0" dirty="0" err="1" smtClean="0"/>
-              <a:t>alebo</a:t>
-            </a:r>
-            <a:r>
-              <a:rPr lang="en-US" baseline="0" dirty="0" smtClean="0"/>
-              <a:t> </a:t>
-            </a:r>
-            <a:r>
-              <a:rPr lang="en-US" baseline="0" dirty="0" err="1" smtClean="0"/>
-              <a:t>viacerych</a:t>
-            </a:r>
-            <a:r>
-              <a:rPr lang="en-US" baseline="0" dirty="0" smtClean="0"/>
-              <a:t> </a:t>
-            </a:r>
-            <a:r>
-              <a:rPr lang="en-US" baseline="0" dirty="0" err="1" smtClean="0"/>
-              <a:t>nukleotidovych</a:t>
-            </a:r>
-            <a:r>
-              <a:rPr lang="en-US" baseline="0" dirty="0" smtClean="0"/>
-              <a:t> </a:t>
-            </a:r>
-            <a:r>
-              <a:rPr lang="en-US" baseline="0" dirty="0" err="1" smtClean="0"/>
-              <a:t>parov</a:t>
-            </a:r>
-            <a:r>
-              <a:rPr lang="en-US" baseline="0" dirty="0" smtClean="0"/>
-              <a:t>, </a:t>
-            </a:r>
-            <a:r>
-              <a:rPr lang="en-US" baseline="0" dirty="0" err="1" smtClean="0"/>
-              <a:t>vacsinou</a:t>
-            </a:r>
-            <a:r>
-              <a:rPr lang="en-US" baseline="0" dirty="0" smtClean="0"/>
-              <a:t> </a:t>
-            </a:r>
-            <a:r>
-              <a:rPr lang="en-US" baseline="0" dirty="0" err="1" smtClean="0"/>
-              <a:t>nic</a:t>
-            </a:r>
-            <a:r>
-              <a:rPr lang="en-US" baseline="0" dirty="0" smtClean="0"/>
-              <a:t> </a:t>
-            </a:r>
-            <a:r>
-              <a:rPr lang="en-US" baseline="0" dirty="0" err="1" smtClean="0"/>
-              <a:t>nespravi</a:t>
-            </a:r>
-            <a:r>
-              <a:rPr lang="en-US" baseline="0" dirty="0" smtClean="0"/>
-              <a:t> </a:t>
-            </a:r>
-            <a:r>
-              <a:rPr lang="en-US" baseline="0" dirty="0" err="1" smtClean="0"/>
-              <a:t>lebo</a:t>
-            </a:r>
-            <a:r>
-              <a:rPr lang="en-US" baseline="0" dirty="0" smtClean="0"/>
-              <a:t> </a:t>
-            </a:r>
-            <a:r>
-              <a:rPr lang="en-US" baseline="0" dirty="0" err="1" smtClean="0"/>
-              <a:t>bunka</a:t>
-            </a:r>
-            <a:r>
-              <a:rPr lang="en-US" baseline="0" dirty="0" smtClean="0"/>
-              <a:t> </a:t>
-            </a:r>
-            <a:r>
-              <a:rPr lang="en-US" baseline="0" dirty="0" err="1" smtClean="0"/>
-              <a:t>umrie</a:t>
-            </a:r>
-            <a:r>
-              <a:rPr lang="en-US" baseline="0" dirty="0" smtClean="0"/>
-              <a:t> </a:t>
-            </a:r>
-            <a:r>
-              <a:rPr lang="en-US" baseline="0" dirty="0" err="1" smtClean="0"/>
-              <a:t>alebo</a:t>
-            </a:r>
-            <a:r>
-              <a:rPr lang="en-US" baseline="0" dirty="0" smtClean="0"/>
-              <a:t> </a:t>
-            </a:r>
-            <a:r>
-              <a:rPr lang="en-US" baseline="0" dirty="0" err="1" smtClean="0"/>
-              <a:t>sa</a:t>
-            </a:r>
-            <a:r>
-              <a:rPr lang="en-US" baseline="0" dirty="0" smtClean="0"/>
-              <a:t> to </a:t>
-            </a:r>
-            <a:r>
-              <a:rPr lang="en-US" baseline="0" dirty="0" err="1" smtClean="0"/>
-              <a:t>stane</a:t>
+              <a:t>bohuzial</a:t>
+            </a:r>
+            <a:r>
+              <a:rPr lang="en-US" baseline="0" dirty="0" smtClean="0"/>
+              <a:t> </a:t>
+            </a:r>
+            <a:r>
+              <a:rPr lang="en-US" baseline="0" dirty="0" err="1" smtClean="0"/>
+              <a:t>boli</a:t>
+            </a:r>
+            <a:r>
+              <a:rPr lang="en-US" baseline="0" dirty="0" smtClean="0"/>
+              <a:t> </a:t>
+            </a:r>
+            <a:r>
+              <a:rPr lang="en-US" baseline="0" dirty="0" err="1" smtClean="0"/>
+              <a:t>robene</a:t>
+            </a:r>
+            <a:r>
+              <a:rPr lang="en-US" baseline="0" dirty="0" smtClean="0"/>
+              <a:t> </a:t>
+            </a:r>
+            <a:r>
+              <a:rPr lang="en-US" baseline="0" dirty="0" err="1" smtClean="0"/>
+              <a:t>iba</a:t>
             </a:r>
             <a:r>
               <a:rPr lang="en-US" baseline="0" dirty="0" smtClean="0"/>
@@ -995,7 +1425,271 @@
             </a:r>
             <a:r>
               <a:rPr lang="en-US" baseline="0" dirty="0" smtClean="0"/>
-              <a:t> junk DNA</a:t>
+              <a:t> </a:t>
+            </a:r>
+            <a:r>
+              <a:rPr lang="en-US" baseline="0" dirty="0" err="1" smtClean="0"/>
+              <a:t>uzemi</a:t>
+            </a:r>
+            <a:r>
+              <a:rPr lang="en-US" baseline="0" dirty="0" smtClean="0"/>
+              <a:t> USA </a:t>
+            </a:r>
+            <a:r>
+              <a:rPr lang="en-US" baseline="0" dirty="0" err="1" smtClean="0"/>
+              <a:t>maju</a:t>
+            </a:r>
+            <a:r>
+              <a:rPr lang="en-US" baseline="0" dirty="0" smtClean="0"/>
+              <a:t> </a:t>
+            </a:r>
+            <a:r>
+              <a:rPr lang="en-US" baseline="0" dirty="0" err="1" smtClean="0"/>
+              <a:t>geneticke</a:t>
+            </a:r>
+            <a:r>
+              <a:rPr lang="en-US" baseline="0" dirty="0" smtClean="0"/>
+              <a:t> </a:t>
+            </a:r>
+            <a:r>
+              <a:rPr lang="en-US" baseline="0" dirty="0" err="1" smtClean="0"/>
+              <a:t>poruchy</a:t>
+            </a:r>
+            <a:r>
+              <a:rPr lang="en-US" baseline="0" dirty="0" smtClean="0"/>
+              <a:t> </a:t>
+            </a:r>
+            <a:r>
+              <a:rPr lang="en-US" baseline="0" dirty="0" err="1" smtClean="0"/>
+              <a:t>za</a:t>
+            </a:r>
+            <a:r>
+              <a:rPr lang="en-US" baseline="0" dirty="0" smtClean="0"/>
+              <a:t> </a:t>
+            </a:r>
+            <a:r>
+              <a:rPr lang="en-US" baseline="0" dirty="0" err="1" smtClean="0"/>
+              <a:t>nasledok</a:t>
+            </a:r>
+            <a:r>
+              <a:rPr lang="en-US" baseline="0" dirty="0" smtClean="0"/>
+              <a:t> 20percent </a:t>
+            </a:r>
+            <a:r>
+              <a:rPr lang="en-US" baseline="0" dirty="0" err="1" smtClean="0"/>
+              <a:t>umrti</a:t>
+            </a:r>
+            <a:r>
+              <a:rPr lang="en-US" baseline="0" dirty="0" smtClean="0"/>
+              <a:t> </a:t>
+            </a:r>
+            <a:r>
+              <a:rPr lang="en-US" baseline="0" dirty="0" err="1" smtClean="0"/>
+              <a:t>novorodencov</a:t>
+            </a:r>
+            <a:r>
+              <a:rPr lang="en-US" baseline="0" dirty="0" smtClean="0"/>
+              <a:t> do 1 </a:t>
+            </a:r>
+            <a:r>
+              <a:rPr lang="en-US" baseline="0" dirty="0" err="1" smtClean="0"/>
+              <a:t>roka</a:t>
+            </a:r>
+            <a:r>
+              <a:rPr lang="en-US" baseline="0" dirty="0" smtClean="0"/>
+              <a:t> a 30 percent </a:t>
+            </a:r>
+            <a:r>
+              <a:rPr lang="en-US" baseline="0" dirty="0" err="1" smtClean="0"/>
+              <a:t>vsetkych</a:t>
+            </a:r>
+            <a:r>
+              <a:rPr lang="en-US" baseline="0" dirty="0" smtClean="0"/>
+              <a:t> </a:t>
+            </a:r>
+            <a:r>
+              <a:rPr lang="en-US" baseline="0" dirty="0" err="1" smtClean="0"/>
+              <a:t>hospitalizovanych</a:t>
+            </a:r>
+            <a:r>
+              <a:rPr lang="en-US" baseline="0" dirty="0" smtClean="0"/>
+              <a:t> </a:t>
+            </a:r>
+            <a:r>
+              <a:rPr lang="en-US" baseline="0" dirty="0" err="1" smtClean="0"/>
+              <a:t>pacientov</a:t>
+            </a:r>
+            <a:r>
+              <a:rPr lang="en-US" baseline="0" dirty="0" smtClean="0"/>
+              <a:t>. Na </a:t>
+            </a:r>
+            <a:r>
+              <a:rPr lang="en-US" baseline="0" dirty="0" err="1" smtClean="0"/>
+              <a:t>infografike</a:t>
+            </a:r>
+            <a:r>
+              <a:rPr lang="en-US" baseline="0" dirty="0" smtClean="0"/>
+              <a:t> je </a:t>
+            </a:r>
+            <a:r>
+              <a:rPr lang="en-US" baseline="0" dirty="0" err="1" smtClean="0"/>
+              <a:t>mozne</a:t>
+            </a:r>
+            <a:r>
+              <a:rPr lang="en-US" baseline="0" dirty="0" smtClean="0"/>
+              <a:t> </a:t>
+            </a:r>
+            <a:r>
+              <a:rPr lang="en-US" baseline="0" dirty="0" err="1" smtClean="0"/>
+              <a:t>vidiet</a:t>
+            </a:r>
+            <a:r>
+              <a:rPr lang="en-US" baseline="0" dirty="0" smtClean="0"/>
+              <a:t> </a:t>
+            </a:r>
+            <a:r>
+              <a:rPr lang="en-US" baseline="0" dirty="0" err="1" smtClean="0"/>
+              <a:t>ze</a:t>
+            </a:r>
+            <a:r>
+              <a:rPr lang="en-US" baseline="0" dirty="0" smtClean="0"/>
+              <a:t> 73percent </a:t>
+            </a:r>
+            <a:r>
+              <a:rPr lang="en-US" baseline="0" dirty="0" err="1" smtClean="0"/>
+              <a:t>opytanych</a:t>
+            </a:r>
+            <a:r>
+              <a:rPr lang="en-US" baseline="0" dirty="0" smtClean="0"/>
+              <a:t> by </a:t>
+            </a:r>
+            <a:r>
+              <a:rPr lang="en-US" baseline="0" dirty="0" err="1" smtClean="0"/>
+              <a:t>chcelo</a:t>
+            </a:r>
+            <a:r>
+              <a:rPr lang="en-US" baseline="0" dirty="0" smtClean="0"/>
+              <a:t> </a:t>
+            </a:r>
+            <a:r>
+              <a:rPr lang="en-US" baseline="0" dirty="0" err="1" smtClean="0"/>
+              <a:t>podstupit</a:t>
+            </a:r>
+            <a:r>
+              <a:rPr lang="en-US" baseline="0" dirty="0" smtClean="0"/>
+              <a:t> </a:t>
+            </a:r>
+            <a:r>
+              <a:rPr lang="en-US" baseline="0" dirty="0" err="1" smtClean="0"/>
+              <a:t>geneticke</a:t>
+            </a:r>
+            <a:r>
+              <a:rPr lang="en-US" baseline="0" dirty="0" smtClean="0"/>
+              <a:t> testy a </a:t>
+            </a:r>
+            <a:r>
+              <a:rPr lang="en-US" baseline="0" dirty="0" err="1" smtClean="0"/>
+              <a:t>boli</a:t>
+            </a:r>
+            <a:r>
+              <a:rPr lang="en-US" baseline="0" dirty="0" smtClean="0"/>
+              <a:t> by </a:t>
+            </a:r>
+            <a:r>
+              <a:rPr lang="en-US" baseline="0" dirty="0" err="1" smtClean="0"/>
+              <a:t>ochotni</a:t>
+            </a:r>
+            <a:r>
+              <a:rPr lang="en-US" baseline="0" dirty="0" smtClean="0"/>
+              <a:t> </a:t>
+            </a:r>
+            <a:r>
+              <a:rPr lang="en-US" baseline="0" dirty="0" err="1" smtClean="0"/>
+              <a:t>na</a:t>
+            </a:r>
+            <a:r>
+              <a:rPr lang="en-US" baseline="0" dirty="0" smtClean="0"/>
+              <a:t> </a:t>
+            </a:r>
+            <a:r>
+              <a:rPr lang="en-US" baseline="0" dirty="0" err="1" smtClean="0"/>
+              <a:t>zaklade</a:t>
+            </a:r>
+            <a:r>
+              <a:rPr lang="en-US" baseline="0" dirty="0" smtClean="0"/>
+              <a:t> </a:t>
+            </a:r>
+            <a:r>
+              <a:rPr lang="en-US" baseline="0" dirty="0" err="1" smtClean="0"/>
+              <a:t>nich</a:t>
+            </a:r>
+            <a:r>
+              <a:rPr lang="en-US" baseline="0" dirty="0" smtClean="0"/>
+              <a:t> </a:t>
+            </a:r>
+            <a:r>
+              <a:rPr lang="en-US" baseline="0" dirty="0" err="1" smtClean="0"/>
+              <a:t>upravit</a:t>
+            </a:r>
+            <a:r>
+              <a:rPr lang="en-US" baseline="0" dirty="0" smtClean="0"/>
+              <a:t> </a:t>
+            </a:r>
+            <a:r>
+              <a:rPr lang="en-US" baseline="0" dirty="0" err="1" smtClean="0"/>
+              <a:t>svoj</a:t>
+            </a:r>
+            <a:r>
+              <a:rPr lang="en-US" baseline="0" dirty="0" smtClean="0"/>
+              <a:t> </a:t>
+            </a:r>
+            <a:r>
+              <a:rPr lang="en-US" baseline="0" dirty="0" err="1" smtClean="0"/>
+              <a:t>zivotny</a:t>
+            </a:r>
+            <a:r>
+              <a:rPr lang="en-US" baseline="0" dirty="0" smtClean="0"/>
+              <a:t> </a:t>
+            </a:r>
+            <a:r>
+              <a:rPr lang="en-US" baseline="0" dirty="0" err="1" smtClean="0"/>
+              <a:t>styl</a:t>
+            </a:r>
+            <a:r>
+              <a:rPr lang="en-US" baseline="0" dirty="0" smtClean="0"/>
+              <a:t>, no </a:t>
+            </a:r>
+            <a:r>
+              <a:rPr lang="en-US" baseline="0" dirty="0" err="1" smtClean="0"/>
+              <a:t>iba</a:t>
+            </a:r>
+            <a:r>
+              <a:rPr lang="en-US" baseline="0" dirty="0" smtClean="0"/>
+              <a:t> 2percenta </a:t>
+            </a:r>
+            <a:r>
+              <a:rPr lang="en-US" baseline="0" dirty="0" err="1" smtClean="0"/>
+              <a:t>populacie</a:t>
+            </a:r>
+            <a:r>
+              <a:rPr lang="en-US" baseline="0" dirty="0" smtClean="0"/>
+              <a:t> USA bolo </a:t>
+            </a:r>
+            <a:r>
+              <a:rPr lang="en-US" baseline="0" dirty="0" err="1" smtClean="0"/>
+              <a:t>geneticky</a:t>
+            </a:r>
+            <a:r>
+              <a:rPr lang="en-US" baseline="0" dirty="0" smtClean="0"/>
+              <a:t> </a:t>
+            </a:r>
+            <a:r>
+              <a:rPr lang="en-US" baseline="0" dirty="0" err="1" smtClean="0"/>
+              <a:t>vysetrenych</a:t>
+            </a:r>
+            <a:r>
+              <a:rPr lang="en-US" baseline="0" dirty="0" smtClean="0"/>
+              <a:t>.</a:t>
             </a:r>
             <a:endParaRPr lang="en-US" dirty="0"/>
           </a:p>
@@ -1018,7 +1712,7 @@
           <a:p>
             <a:fld id="{8A2CF31D-19BA-0D49-9C18-D660A2246B72}" type="slidenum">
               <a:rPr lang="en-US" smtClean="0"/>
-              <a:t>5</a:t>
+              <a:t>2</a:t>
             </a:fld>
             <a:endParaRPr lang="en-US"/>
           </a:p>
@@ -1027,7 +1721,7 @@
     </p:spTree>
     <p:extLst>
       <p:ext uri="{BB962C8B-B14F-4D97-AF65-F5344CB8AC3E}">
-        <p14:creationId xmlns:p14="http://schemas.microsoft.com/office/powerpoint/2010/main" val="3356343109"/>
+        <p14:creationId xmlns:p14="http://schemas.microsoft.com/office/powerpoint/2010/main" val="410516714"/>
       </p:ext>
     </p:extLst>
   </p:cSld>
@@ -1081,6 +1775,222 @@
           <a:bodyPr/>
           <a:lstStyle/>
           <a:p>
+            <a:r>
+              <a:rPr lang="en-US" dirty="0" err="1" smtClean="0"/>
+              <a:t>Mojim</a:t>
+            </a:r>
+            <a:r>
+              <a:rPr lang="en-US" baseline="0" dirty="0" smtClean="0"/>
+              <a:t> </a:t>
+            </a:r>
+            <a:r>
+              <a:rPr lang="en-US" baseline="0" dirty="0" err="1" smtClean="0"/>
+              <a:t>navrhnutym</a:t>
+            </a:r>
+            <a:r>
+              <a:rPr lang="en-US" baseline="0" dirty="0" smtClean="0"/>
+              <a:t> </a:t>
+            </a:r>
+            <a:r>
+              <a:rPr lang="en-US" baseline="0" dirty="0" err="1" smtClean="0"/>
+              <a:t>vystupom</a:t>
+            </a:r>
+            <a:r>
+              <a:rPr lang="en-US" baseline="0" dirty="0" smtClean="0"/>
+              <a:t> </a:t>
+            </a:r>
+            <a:r>
+              <a:rPr lang="en-US" baseline="0" dirty="0" err="1" smtClean="0"/>
+              <a:t>prace</a:t>
+            </a:r>
+            <a:r>
+              <a:rPr lang="en-US" baseline="0" dirty="0" smtClean="0"/>
+              <a:t> je </a:t>
+            </a:r>
+            <a:r>
+              <a:rPr lang="en-US" baseline="0" dirty="0" err="1" smtClean="0"/>
+              <a:t>jednoducha</a:t>
+            </a:r>
+            <a:r>
+              <a:rPr lang="en-US" baseline="0" dirty="0" smtClean="0"/>
+              <a:t> </a:t>
+            </a:r>
+            <a:r>
+              <a:rPr lang="en-US" baseline="0" dirty="0" err="1" smtClean="0"/>
+              <a:t>tabulka</a:t>
+            </a:r>
+            <a:r>
+              <a:rPr lang="en-US" baseline="0" dirty="0" smtClean="0"/>
+              <a:t>, </a:t>
+            </a:r>
+            <a:r>
+              <a:rPr lang="en-US" baseline="0" dirty="0" err="1" smtClean="0"/>
+              <a:t>kde</a:t>
+            </a:r>
+            <a:r>
+              <a:rPr lang="en-US" baseline="0" dirty="0" smtClean="0"/>
+              <a:t> pre </a:t>
+            </a:r>
+            <a:r>
+              <a:rPr lang="en-US" baseline="0" dirty="0" err="1" smtClean="0"/>
+              <a:t>vstup</a:t>
+            </a:r>
+            <a:r>
+              <a:rPr lang="en-US" baseline="0" dirty="0" smtClean="0"/>
+              <a:t> </a:t>
+            </a:r>
+            <a:r>
+              <a:rPr lang="en-US" baseline="0" dirty="0" err="1" smtClean="0"/>
+              <a:t>sekvencovanej</a:t>
+            </a:r>
+            <a:r>
+              <a:rPr lang="en-US" baseline="0" dirty="0" smtClean="0"/>
+              <a:t> DNA </a:t>
+            </a:r>
+            <a:r>
+              <a:rPr lang="en-US" baseline="0" dirty="0" err="1" smtClean="0"/>
+              <a:t>zo</a:t>
+            </a:r>
+            <a:r>
+              <a:rPr lang="en-US" baseline="0" dirty="0" smtClean="0"/>
+              <a:t> </a:t>
+            </a:r>
+            <a:r>
+              <a:rPr lang="en-US" baseline="0" dirty="0" err="1" smtClean="0"/>
+              <a:t>sekvenatora</a:t>
+            </a:r>
+            <a:r>
+              <a:rPr lang="en-US" baseline="0" dirty="0" smtClean="0"/>
+              <a:t> </a:t>
+            </a:r>
+            <a:r>
+              <a:rPr lang="en-US" baseline="0" dirty="0" err="1" smtClean="0"/>
+              <a:t>budu</a:t>
+            </a:r>
+            <a:r>
+              <a:rPr lang="en-US" baseline="0" dirty="0" smtClean="0"/>
+              <a:t> </a:t>
+            </a:r>
+            <a:r>
+              <a:rPr lang="en-US" baseline="0" dirty="0" err="1" smtClean="0"/>
+              <a:t>zobrazene</a:t>
+            </a:r>
+            <a:r>
+              <a:rPr lang="en-US" baseline="0" dirty="0" smtClean="0"/>
+              <a:t> </a:t>
+            </a:r>
+            <a:r>
+              <a:rPr lang="en-US" baseline="0" dirty="0" err="1" smtClean="0"/>
+              <a:t>vysledky</a:t>
+            </a:r>
+            <a:r>
+              <a:rPr lang="en-US" baseline="0" dirty="0" smtClean="0"/>
+              <a:t> </a:t>
+            </a:r>
+            <a:r>
+              <a:rPr lang="en-US" baseline="0" dirty="0" err="1" smtClean="0"/>
+              <a:t>vybranych</a:t>
+            </a:r>
+            <a:r>
+              <a:rPr lang="en-US" baseline="0" dirty="0" smtClean="0"/>
+              <a:t> </a:t>
+            </a:r>
+            <a:r>
+              <a:rPr lang="en-US" baseline="0" dirty="0" err="1" smtClean="0"/>
+              <a:t>ochoreni</a:t>
+            </a:r>
+            <a:r>
+              <a:rPr lang="en-US" baseline="0" dirty="0" smtClean="0"/>
+              <a:t>. Je </a:t>
+            </a:r>
+            <a:r>
+              <a:rPr lang="en-US" baseline="0" dirty="0" err="1" smtClean="0"/>
+              <a:t>nutne</a:t>
+            </a:r>
+            <a:r>
+              <a:rPr lang="en-US" baseline="0" dirty="0" smtClean="0"/>
+              <a:t> </a:t>
+            </a:r>
+            <a:r>
+              <a:rPr lang="en-US" baseline="0" dirty="0" err="1" smtClean="0"/>
+              <a:t>podotknut</a:t>
+            </a:r>
+            <a:r>
+              <a:rPr lang="en-US" baseline="0" dirty="0" smtClean="0"/>
+              <a:t>, </a:t>
+            </a:r>
+            <a:r>
+              <a:rPr lang="en-US" baseline="0" dirty="0" err="1" smtClean="0"/>
+              <a:t>ze</a:t>
+            </a:r>
+            <a:r>
+              <a:rPr lang="en-US" baseline="0" dirty="0" smtClean="0"/>
+              <a:t> </a:t>
+            </a:r>
+            <a:r>
+              <a:rPr lang="en-US" baseline="0" dirty="0" err="1" smtClean="0"/>
+              <a:t>mojim</a:t>
+            </a:r>
+            <a:r>
+              <a:rPr lang="en-US" baseline="0" dirty="0" smtClean="0"/>
+              <a:t> </a:t>
+            </a:r>
+            <a:r>
+              <a:rPr lang="en-US" baseline="0" dirty="0" err="1" smtClean="0"/>
+              <a:t>zamerom</a:t>
+            </a:r>
+            <a:r>
+              <a:rPr lang="en-US" baseline="0" dirty="0" smtClean="0"/>
+              <a:t> je </a:t>
+            </a:r>
+            <a:r>
+              <a:rPr lang="en-US" baseline="0" dirty="0" err="1" smtClean="0"/>
+              <a:t>vytvorenie</a:t>
+            </a:r>
+            <a:r>
+              <a:rPr lang="en-US" baseline="0" dirty="0" smtClean="0"/>
+              <a:t> </a:t>
+            </a:r>
+            <a:r>
+              <a:rPr lang="en-US" baseline="0" dirty="0" err="1" smtClean="0"/>
+              <a:t>weboveho</a:t>
+            </a:r>
+            <a:r>
+              <a:rPr lang="en-US" baseline="0" dirty="0" smtClean="0"/>
+              <a:t> </a:t>
+            </a:r>
+            <a:r>
+              <a:rPr lang="en-US" baseline="0" dirty="0" err="1" smtClean="0"/>
+              <a:t>pristupu</a:t>
+            </a:r>
+            <a:r>
+              <a:rPr lang="en-US" baseline="0" dirty="0" smtClean="0"/>
+              <a:t> s </a:t>
+            </a:r>
+            <a:r>
+              <a:rPr lang="en-US" baseline="0" dirty="0" err="1" smtClean="0"/>
+              <a:t>pouzitim</a:t>
+            </a:r>
+            <a:r>
+              <a:rPr lang="en-US" baseline="0" dirty="0" smtClean="0"/>
+              <a:t> </a:t>
+            </a:r>
+            <a:r>
+              <a:rPr lang="en-US" baseline="0" dirty="0" err="1" smtClean="0"/>
+              <a:t>webovych</a:t>
+            </a:r>
+            <a:r>
+              <a:rPr lang="en-US" baseline="0" dirty="0" smtClean="0"/>
+              <a:t> </a:t>
+            </a:r>
+            <a:r>
+              <a:rPr lang="en-US" baseline="0" dirty="0" err="1" smtClean="0"/>
+              <a:t>technologii</a:t>
+            </a:r>
+            <a:r>
+              <a:rPr lang="en-US" baseline="0" dirty="0" smtClean="0"/>
+              <a:t>.</a:t>
+            </a:r>
             <a:endParaRPr lang="en-US" dirty="0"/>
           </a:p>
         </p:txBody>
@@ -1102,7 +2012,7 @@
           <a:p>
             <a:fld id="{8A2CF31D-19BA-0D49-9C18-D660A2246B72}" type="slidenum">
               <a:rPr lang="en-US" smtClean="0"/>
-              <a:t>6</a:t>
+              <a:t>3</a:t>
             </a:fld>
             <a:endParaRPr lang="en-US"/>
           </a:p>
@@ -1111,7 +2021,7 @@
     </p:spTree>
     <p:extLst>
       <p:ext uri="{BB962C8B-B14F-4D97-AF65-F5344CB8AC3E}">
-        <p14:creationId xmlns:p14="http://schemas.microsoft.com/office/powerpoint/2010/main" val="3192541099"/>
+        <p14:creationId xmlns:p14="http://schemas.microsoft.com/office/powerpoint/2010/main" val="1968248523"/>
       </p:ext>
     </p:extLst>
   </p:cSld>
@@ -1167,6 +2077,2234 @@
           <a:p>
             <a:r>
               <a:rPr lang="en-US" dirty="0" err="1" smtClean="0"/>
+              <a:t>Aby</a:t>
+            </a:r>
+            <a:r>
+              <a:rPr lang="en-US" dirty="0" smtClean="0"/>
+              <a:t> </a:t>
+            </a:r>
+            <a:r>
+              <a:rPr lang="en-US" dirty="0" err="1" smtClean="0"/>
+              <a:t>sme</a:t>
+            </a:r>
+            <a:r>
+              <a:rPr lang="en-US" dirty="0" smtClean="0"/>
+              <a:t> </a:t>
+            </a:r>
+            <a:r>
+              <a:rPr lang="en-US" dirty="0" err="1" smtClean="0"/>
+              <a:t>mohli</a:t>
+            </a:r>
+            <a:r>
+              <a:rPr lang="en-US" dirty="0" smtClean="0"/>
+              <a:t> </a:t>
+            </a:r>
+            <a:r>
+              <a:rPr lang="en-US" dirty="0" err="1" smtClean="0"/>
+              <a:t>analyzovat</a:t>
+            </a:r>
+            <a:r>
+              <a:rPr lang="en-US" dirty="0" smtClean="0"/>
+              <a:t> DNA je </a:t>
+            </a:r>
+            <a:r>
+              <a:rPr lang="en-US" dirty="0" err="1" smtClean="0"/>
+              <a:t>nutne</a:t>
+            </a:r>
+            <a:r>
+              <a:rPr lang="en-US" dirty="0" smtClean="0"/>
+              <a:t> </a:t>
+            </a:r>
+            <a:r>
+              <a:rPr lang="en-US" dirty="0" err="1" smtClean="0"/>
+              <a:t>oboznamenie</a:t>
+            </a:r>
+            <a:r>
+              <a:rPr lang="en-US" baseline="0" dirty="0" smtClean="0"/>
+              <a:t> </a:t>
+            </a:r>
+            <a:r>
+              <a:rPr lang="en-US" baseline="0" dirty="0" err="1" smtClean="0"/>
+              <a:t>sa</a:t>
+            </a:r>
+            <a:r>
+              <a:rPr lang="en-US" baseline="0" dirty="0" smtClean="0"/>
+              <a:t> s </a:t>
+            </a:r>
+            <a:r>
+              <a:rPr lang="en-US" baseline="0" dirty="0" err="1" smtClean="0"/>
+              <a:t>absolutnymi</a:t>
+            </a:r>
+            <a:r>
+              <a:rPr lang="en-US" baseline="0" dirty="0" smtClean="0"/>
+              <a:t> </a:t>
+            </a:r>
+            <a:r>
+              <a:rPr lang="en-US" baseline="0" dirty="0" err="1" smtClean="0"/>
+              <a:t>zakladmi</a:t>
+            </a:r>
+            <a:r>
+              <a:rPr lang="en-US" baseline="0" dirty="0" smtClean="0"/>
+              <a:t> </a:t>
+            </a:r>
+            <a:r>
+              <a:rPr lang="en-US" baseline="0" dirty="0" err="1" smtClean="0"/>
+              <a:t>molekularnej</a:t>
+            </a:r>
+            <a:r>
+              <a:rPr lang="en-US" baseline="0" dirty="0" smtClean="0"/>
+              <a:t> </a:t>
+            </a:r>
+            <a:r>
+              <a:rPr lang="en-US" baseline="0" dirty="0" err="1" smtClean="0"/>
+              <a:t>biologie</a:t>
+            </a:r>
+            <a:r>
+              <a:rPr lang="en-US" baseline="0" dirty="0" smtClean="0"/>
+              <a:t>. Na </a:t>
+            </a:r>
+            <a:r>
+              <a:rPr lang="en-US" baseline="0" dirty="0" err="1" smtClean="0"/>
+              <a:t>obr</a:t>
+            </a:r>
+            <a:r>
+              <a:rPr lang="en-US" baseline="0" dirty="0" smtClean="0"/>
+              <a:t>. </a:t>
+            </a:r>
+            <a:r>
+              <a:rPr lang="en-US" baseline="0" dirty="0" err="1" smtClean="0"/>
+              <a:t>Vlavo</a:t>
+            </a:r>
+            <a:r>
+              <a:rPr lang="en-US" baseline="0" dirty="0" smtClean="0"/>
+              <a:t> je </a:t>
+            </a:r>
+            <a:r>
+              <a:rPr lang="en-US" baseline="0" dirty="0" err="1" smtClean="0"/>
+              <a:t>eukaryoticka</a:t>
+            </a:r>
+            <a:r>
+              <a:rPr lang="en-US" baseline="0" dirty="0" smtClean="0"/>
+              <a:t> </a:t>
+            </a:r>
+            <a:r>
+              <a:rPr lang="en-US" baseline="0" dirty="0" err="1" smtClean="0"/>
+              <a:t>bunka</a:t>
+            </a:r>
+            <a:r>
+              <a:rPr lang="en-US" baseline="0" dirty="0" smtClean="0"/>
+              <a:t>, </a:t>
+            </a:r>
+            <a:r>
+              <a:rPr lang="en-US" baseline="0" dirty="0" err="1" smtClean="0"/>
+              <a:t>eukaryoticka</a:t>
+            </a:r>
+            <a:r>
+              <a:rPr lang="en-US" baseline="0" dirty="0" smtClean="0"/>
+              <a:t> </a:t>
+            </a:r>
+            <a:r>
+              <a:rPr lang="en-US" baseline="0" dirty="0" err="1" smtClean="0"/>
+              <a:t>znamena</a:t>
+            </a:r>
+            <a:r>
+              <a:rPr lang="en-US" baseline="0" dirty="0" smtClean="0"/>
+              <a:t>, </a:t>
+            </a:r>
+            <a:r>
+              <a:rPr lang="en-US" baseline="0" dirty="0" err="1" smtClean="0"/>
+              <a:t>ze</a:t>
+            </a:r>
+            <a:r>
+              <a:rPr lang="en-US" baseline="0" dirty="0" smtClean="0"/>
+              <a:t> DNA je </a:t>
+            </a:r>
+            <a:r>
+              <a:rPr lang="en-US" baseline="0" dirty="0" err="1" smtClean="0"/>
+              <a:t>ulozena</a:t>
+            </a:r>
+            <a:r>
+              <a:rPr lang="en-US" baseline="0" dirty="0" smtClean="0"/>
+              <a:t> v </a:t>
+            </a:r>
+            <a:r>
+              <a:rPr lang="en-US" baseline="0" dirty="0" err="1" smtClean="0"/>
+              <a:t>oddelenom</a:t>
+            </a:r>
+            <a:r>
+              <a:rPr lang="en-US" baseline="0" dirty="0" smtClean="0"/>
+              <a:t> </a:t>
+            </a:r>
+            <a:r>
+              <a:rPr lang="en-US" baseline="0" dirty="0" err="1" smtClean="0"/>
+              <a:t>jadre</a:t>
+            </a:r>
+            <a:r>
+              <a:rPr lang="en-US" baseline="0" dirty="0" smtClean="0"/>
+              <a:t>. V </a:t>
+            </a:r>
+            <a:r>
+              <a:rPr lang="en-US" baseline="0" dirty="0" err="1" smtClean="0"/>
+              <a:t>tomto</a:t>
+            </a:r>
+            <a:r>
+              <a:rPr lang="en-US" baseline="0" dirty="0" smtClean="0"/>
+              <a:t> </a:t>
+            </a:r>
+            <a:r>
+              <a:rPr lang="en-US" baseline="0" dirty="0" err="1" smtClean="0"/>
+              <a:t>jadre</a:t>
+            </a:r>
+            <a:r>
+              <a:rPr lang="en-US" baseline="0" dirty="0" smtClean="0"/>
+              <a:t> </a:t>
+            </a:r>
+            <a:r>
+              <a:rPr lang="en-US" baseline="0" dirty="0" err="1" smtClean="0"/>
+              <a:t>sa</a:t>
+            </a:r>
+            <a:r>
+              <a:rPr lang="en-US" baseline="0" dirty="0" smtClean="0"/>
+              <a:t> DNA </a:t>
+            </a:r>
+            <a:r>
+              <a:rPr lang="en-US" baseline="0" dirty="0" err="1" smtClean="0"/>
+              <a:t>molekuly</a:t>
+            </a:r>
+            <a:r>
+              <a:rPr lang="en-US" baseline="0" dirty="0" smtClean="0"/>
+              <a:t> </a:t>
+            </a:r>
+            <a:r>
+              <a:rPr lang="en-US" baseline="0" dirty="0" err="1" smtClean="0"/>
+              <a:t>nachadzaju</a:t>
+            </a:r>
+            <a:r>
+              <a:rPr lang="en-US" baseline="0" dirty="0" smtClean="0"/>
+              <a:t> v </a:t>
+            </a:r>
+            <a:r>
+              <a:rPr lang="en-US" baseline="0" dirty="0" err="1" smtClean="0"/>
+              <a:t>podobe</a:t>
+            </a:r>
+            <a:r>
+              <a:rPr lang="en-US" baseline="0" dirty="0" smtClean="0"/>
+              <a:t> </a:t>
+            </a:r>
+            <a:r>
+              <a:rPr lang="en-US" baseline="0" dirty="0" err="1" smtClean="0"/>
+              <a:t>chromozomov</a:t>
+            </a:r>
+            <a:r>
+              <a:rPr lang="en-US" baseline="0" dirty="0" smtClean="0"/>
+              <a:t>. </a:t>
+            </a:r>
+            <a:r>
+              <a:rPr lang="en-US" baseline="0" dirty="0" err="1" smtClean="0"/>
+              <a:t>Clovek</a:t>
+            </a:r>
+            <a:r>
+              <a:rPr lang="en-US" baseline="0" dirty="0" smtClean="0"/>
+              <a:t> je </a:t>
+            </a:r>
+            <a:r>
+              <a:rPr lang="en-US" baseline="0" dirty="0" err="1" smtClean="0"/>
+              <a:t>diploidny</a:t>
+            </a:r>
+            <a:r>
+              <a:rPr lang="en-US" baseline="0" dirty="0" smtClean="0"/>
+              <a:t> </a:t>
+            </a:r>
+            <a:r>
+              <a:rPr lang="en-US" baseline="0" dirty="0" err="1" smtClean="0"/>
+              <a:t>organizmus</a:t>
+            </a:r>
+            <a:r>
+              <a:rPr lang="en-US" baseline="0" dirty="0" smtClean="0"/>
+              <a:t> a </a:t>
+            </a:r>
+            <a:r>
+              <a:rPr lang="en-US" baseline="0" dirty="0" err="1" smtClean="0"/>
+              <a:t>teda</a:t>
+            </a:r>
+            <a:r>
+              <a:rPr lang="en-US" baseline="0" dirty="0" smtClean="0"/>
+              <a:t> ma 23 </a:t>
+            </a:r>
+            <a:r>
+              <a:rPr lang="en-US" baseline="0" dirty="0" err="1" smtClean="0"/>
+              <a:t>parov</a:t>
+            </a:r>
+            <a:r>
+              <a:rPr lang="en-US" baseline="0" dirty="0" smtClean="0"/>
+              <a:t> </a:t>
+            </a:r>
+            <a:r>
+              <a:rPr lang="en-US" baseline="0" dirty="0" err="1" smtClean="0"/>
+              <a:t>chromozomov</a:t>
+            </a:r>
+            <a:r>
+              <a:rPr lang="en-US" baseline="0" dirty="0" smtClean="0"/>
+              <a:t>. Tie </a:t>
+            </a:r>
+            <a:r>
+              <a:rPr lang="en-US" baseline="0" dirty="0" err="1" smtClean="0"/>
+              <a:t>su</a:t>
+            </a:r>
+            <a:r>
+              <a:rPr lang="en-US" baseline="0" dirty="0" smtClean="0"/>
+              <a:t> </a:t>
+            </a:r>
+            <a:r>
+              <a:rPr lang="en-US" baseline="0" dirty="0" err="1" smtClean="0"/>
+              <a:t>jasne</a:t>
+            </a:r>
+            <a:r>
+              <a:rPr lang="en-US" baseline="0" dirty="0" smtClean="0"/>
+              <a:t> </a:t>
+            </a:r>
+            <a:r>
+              <a:rPr lang="en-US" baseline="0" dirty="0" err="1" smtClean="0"/>
+              <a:t>definovane</a:t>
+            </a:r>
+            <a:r>
+              <a:rPr lang="en-US" baseline="0" dirty="0" smtClean="0"/>
+              <a:t> </a:t>
+            </a:r>
+            <a:r>
+              <a:rPr lang="en-US" baseline="0" dirty="0" err="1" smtClean="0"/>
+              <a:t>velkostou</a:t>
+            </a:r>
+            <a:r>
+              <a:rPr lang="en-US" baseline="0" dirty="0" smtClean="0"/>
+              <a:t> a </a:t>
+            </a:r>
+            <a:r>
+              <a:rPr lang="en-US" baseline="0" dirty="0" err="1" smtClean="0"/>
+              <a:t>tvarom</a:t>
+            </a:r>
+            <a:r>
+              <a:rPr lang="en-US" baseline="0" dirty="0" smtClean="0"/>
+              <a:t> a </a:t>
+            </a:r>
+            <a:r>
+              <a:rPr lang="en-US" baseline="0" dirty="0" err="1" smtClean="0"/>
+              <a:t>tvoria</a:t>
+            </a:r>
+            <a:r>
+              <a:rPr lang="en-US" baseline="0" dirty="0" smtClean="0"/>
+              <a:t> </a:t>
+            </a:r>
+            <a:r>
+              <a:rPr lang="en-US" baseline="0" dirty="0" err="1" smtClean="0"/>
+              <a:t>karyotyp</a:t>
+            </a:r>
+            <a:r>
+              <a:rPr lang="en-US" baseline="0" dirty="0" smtClean="0"/>
+              <a:t> </a:t>
+            </a:r>
+            <a:r>
+              <a:rPr lang="en-US" baseline="0" dirty="0" err="1" smtClean="0"/>
+              <a:t>organizmu</a:t>
+            </a:r>
+            <a:r>
+              <a:rPr lang="en-US" baseline="0" dirty="0" smtClean="0"/>
+              <a:t> </a:t>
+            </a:r>
+            <a:r>
+              <a:rPr lang="en-US" baseline="0" dirty="0" err="1" smtClean="0"/>
+              <a:t>zobrazeny</a:t>
+            </a:r>
+            <a:r>
+              <a:rPr lang="en-US" baseline="0" dirty="0" smtClean="0"/>
+              <a:t> </a:t>
+            </a:r>
+            <a:r>
+              <a:rPr lang="en-US" baseline="0" dirty="0" err="1" smtClean="0"/>
+              <a:t>na</a:t>
+            </a:r>
+            <a:r>
+              <a:rPr lang="en-US" baseline="0" dirty="0" smtClean="0"/>
+              <a:t> </a:t>
+            </a:r>
+            <a:r>
+              <a:rPr lang="en-US" baseline="0" dirty="0" err="1" smtClean="0"/>
+              <a:t>obrazku</a:t>
+            </a:r>
+            <a:r>
+              <a:rPr lang="en-US" baseline="0" dirty="0" smtClean="0"/>
+              <a:t> v </a:t>
+            </a:r>
+            <a:r>
+              <a:rPr lang="en-US" baseline="0" dirty="0" err="1" smtClean="0"/>
+              <a:t>strede</a:t>
+            </a:r>
+            <a:r>
+              <a:rPr lang="en-US" baseline="0" dirty="0" smtClean="0"/>
+              <a:t>, </a:t>
+            </a:r>
+            <a:r>
+              <a:rPr lang="en-US" baseline="0" dirty="0" err="1" smtClean="0"/>
+              <a:t>karyotyp</a:t>
+            </a:r>
+            <a:r>
+              <a:rPr lang="en-US" baseline="0" dirty="0" smtClean="0"/>
+              <a:t> </a:t>
+            </a:r>
+            <a:r>
+              <a:rPr lang="en-US" baseline="0" dirty="0" err="1" smtClean="0"/>
+              <a:t>zobrazuje</a:t>
+            </a:r>
+            <a:r>
+              <a:rPr lang="en-US" baseline="0" dirty="0" smtClean="0"/>
+              <a:t> </a:t>
+            </a:r>
+            <a:r>
+              <a:rPr lang="en-US" baseline="0" dirty="0" err="1" smtClean="0"/>
+              <a:t>poradie</a:t>
+            </a:r>
+            <a:r>
+              <a:rPr lang="en-US" baseline="0" dirty="0" smtClean="0"/>
+              <a:t> </a:t>
+            </a:r>
+            <a:r>
+              <a:rPr lang="en-US" baseline="0" dirty="0" err="1" smtClean="0"/>
+              <a:t>chromozov</a:t>
+            </a:r>
+            <a:r>
+              <a:rPr lang="en-US" baseline="0" dirty="0" smtClean="0"/>
+              <a:t>. </a:t>
+            </a:r>
+            <a:r>
+              <a:rPr lang="en-US" baseline="0" dirty="0" err="1" smtClean="0"/>
+              <a:t>Konkretny</a:t>
+            </a:r>
+            <a:r>
+              <a:rPr lang="en-US" baseline="0" dirty="0" smtClean="0"/>
+              <a:t> </a:t>
+            </a:r>
+            <a:r>
+              <a:rPr lang="en-US" baseline="0" dirty="0" err="1" smtClean="0"/>
+              <a:t>chromozom</a:t>
+            </a:r>
+            <a:r>
+              <a:rPr lang="en-US" baseline="0" dirty="0" smtClean="0"/>
+              <a:t> </a:t>
+            </a:r>
+            <a:r>
+              <a:rPr lang="en-US" baseline="0" dirty="0" err="1" smtClean="0"/>
+              <a:t>sa</a:t>
+            </a:r>
+            <a:r>
+              <a:rPr lang="en-US" baseline="0" dirty="0" smtClean="0"/>
+              <a:t> </a:t>
+            </a:r>
+            <a:r>
+              <a:rPr lang="en-US" baseline="0" dirty="0" err="1" smtClean="0"/>
+              <a:t>sklada</a:t>
+            </a:r>
+            <a:r>
+              <a:rPr lang="en-US" baseline="0" dirty="0" smtClean="0"/>
+              <a:t> z </a:t>
+            </a:r>
+            <a:r>
+              <a:rPr lang="en-US" baseline="0" dirty="0" err="1" smtClean="0"/>
+              <a:t>molekuly</a:t>
+            </a:r>
+            <a:r>
+              <a:rPr lang="en-US" baseline="0" dirty="0" smtClean="0"/>
+              <a:t> DNA v </a:t>
+            </a:r>
+            <a:r>
+              <a:rPr lang="en-US" baseline="0" dirty="0" err="1" smtClean="0"/>
+              <a:t>tvare</a:t>
+            </a:r>
+            <a:r>
+              <a:rPr lang="en-US" baseline="0" dirty="0" smtClean="0"/>
+              <a:t> </a:t>
+            </a:r>
+            <a:r>
+              <a:rPr lang="en-US" baseline="0" dirty="0" err="1" smtClean="0"/>
+              <a:t>dvojzavitnice</a:t>
+            </a:r>
+            <a:r>
+              <a:rPr lang="en-US" baseline="0" dirty="0" smtClean="0"/>
+              <a:t> </a:t>
+            </a:r>
+            <a:r>
+              <a:rPr lang="en-US" baseline="0" dirty="0" err="1" smtClean="0"/>
+              <a:t>zlozenej</a:t>
+            </a:r>
+            <a:r>
+              <a:rPr lang="en-US" baseline="0" dirty="0" smtClean="0"/>
+              <a:t> </a:t>
+            </a:r>
+            <a:r>
+              <a:rPr lang="en-US" baseline="0" dirty="0" err="1" smtClean="0"/>
+              <a:t>zo</a:t>
+            </a:r>
+            <a:r>
+              <a:rPr lang="en-US" baseline="0" dirty="0" smtClean="0"/>
+              <a:t> </a:t>
+            </a:r>
+            <a:r>
+              <a:rPr lang="en-US" baseline="0" dirty="0" err="1" smtClean="0"/>
+              <a:t>sekvencia</a:t>
+            </a:r>
+            <a:r>
+              <a:rPr lang="en-US" baseline="0" dirty="0" smtClean="0"/>
+              <a:t> </a:t>
+            </a:r>
+            <a:r>
+              <a:rPr lang="en-US" baseline="0" dirty="0" err="1" smtClean="0"/>
+              <a:t>bazovych</a:t>
+            </a:r>
+            <a:r>
+              <a:rPr lang="en-US" baseline="0" dirty="0" smtClean="0"/>
+              <a:t> </a:t>
+            </a:r>
+            <a:r>
+              <a:rPr lang="en-US" baseline="0" dirty="0" err="1" smtClean="0"/>
+              <a:t>parov</a:t>
+            </a:r>
+            <a:r>
+              <a:rPr lang="en-US" baseline="0" dirty="0" smtClean="0"/>
+              <a:t>. Tie </a:t>
+            </a:r>
+            <a:r>
+              <a:rPr lang="en-US" baseline="0" dirty="0" err="1" smtClean="0"/>
+              <a:t>sa</a:t>
+            </a:r>
+            <a:r>
+              <a:rPr lang="en-US" baseline="0" dirty="0" smtClean="0"/>
+              <a:t> </a:t>
+            </a:r>
+            <a:r>
+              <a:rPr lang="en-US" baseline="0" dirty="0" err="1" smtClean="0"/>
+              <a:t>skladaju</a:t>
+            </a:r>
+            <a:r>
+              <a:rPr lang="en-US" baseline="0" dirty="0" smtClean="0"/>
+              <a:t> z </a:t>
+            </a:r>
+            <a:r>
+              <a:rPr lang="en-US" baseline="0" dirty="0" err="1" smtClean="0"/>
+              <a:t>nukleotidov</a:t>
+            </a:r>
+            <a:r>
+              <a:rPr lang="en-US" baseline="0" dirty="0" smtClean="0"/>
+              <a:t> A,T,G,C tie </a:t>
+            </a:r>
+            <a:r>
+              <a:rPr lang="en-US" baseline="0" dirty="0" err="1" smtClean="0"/>
+              <a:t>sa</a:t>
+            </a:r>
+            <a:r>
+              <a:rPr lang="en-US" baseline="0" dirty="0" smtClean="0"/>
+              <a:t> </a:t>
+            </a:r>
+            <a:r>
+              <a:rPr lang="en-US" baseline="0" dirty="0" err="1" smtClean="0"/>
+              <a:t>navazuju</a:t>
+            </a:r>
+            <a:r>
+              <a:rPr lang="en-US" baseline="0" dirty="0" smtClean="0"/>
+              <a:t> AT a CG a </a:t>
+            </a:r>
+            <a:r>
+              <a:rPr lang="en-US" baseline="0" dirty="0" err="1" smtClean="0"/>
+              <a:t>teda</a:t>
+            </a:r>
+            <a:r>
+              <a:rPr lang="en-US" baseline="0" dirty="0" smtClean="0"/>
+              <a:t> 2 </a:t>
+            </a:r>
+            <a:r>
+              <a:rPr lang="en-US" baseline="0" dirty="0" err="1" smtClean="0"/>
+              <a:t>strany</a:t>
+            </a:r>
+            <a:r>
+              <a:rPr lang="en-US" baseline="0" dirty="0" smtClean="0"/>
+              <a:t> </a:t>
+            </a:r>
+            <a:r>
+              <a:rPr lang="en-US" baseline="0" dirty="0" err="1" smtClean="0"/>
+              <a:t>su</a:t>
+            </a:r>
+            <a:r>
+              <a:rPr lang="en-US" baseline="0" dirty="0" smtClean="0"/>
+              <a:t> </a:t>
+            </a:r>
+            <a:r>
+              <a:rPr lang="en-US" baseline="0" dirty="0" err="1" smtClean="0"/>
+              <a:t>komplementarne</a:t>
+            </a:r>
+            <a:r>
+              <a:rPr lang="en-US" baseline="0" dirty="0" smtClean="0"/>
+              <a:t>. 23 </a:t>
+            </a:r>
+            <a:r>
+              <a:rPr lang="en-US" baseline="0" dirty="0" err="1" smtClean="0"/>
+              <a:t>chomozomov</a:t>
+            </a:r>
+            <a:r>
+              <a:rPr lang="en-US" baseline="0" dirty="0" smtClean="0"/>
+              <a:t> </a:t>
+            </a:r>
+            <a:r>
+              <a:rPr lang="en-US" baseline="0" dirty="0" err="1" smtClean="0"/>
+              <a:t>sa</a:t>
+            </a:r>
+            <a:r>
+              <a:rPr lang="en-US" baseline="0" dirty="0" smtClean="0"/>
+              <a:t> </a:t>
+            </a:r>
+            <a:r>
+              <a:rPr lang="en-US" baseline="0" dirty="0" err="1" smtClean="0"/>
+              <a:t>sklada</a:t>
+            </a:r>
+            <a:r>
+              <a:rPr lang="en-US" baseline="0" dirty="0" smtClean="0"/>
+              <a:t> z </a:t>
+            </a:r>
+            <a:r>
+              <a:rPr lang="en-US" baseline="0" dirty="0" err="1" smtClean="0"/>
+              <a:t>priblizne</a:t>
+            </a:r>
+            <a:r>
+              <a:rPr lang="en-US" baseline="0" dirty="0" smtClean="0"/>
+              <a:t> 300miliard </a:t>
+            </a:r>
+            <a:r>
+              <a:rPr lang="en-US" baseline="0" dirty="0" err="1" smtClean="0"/>
+              <a:t>bazovych</a:t>
+            </a:r>
+            <a:r>
+              <a:rPr lang="en-US" baseline="0" dirty="0" smtClean="0"/>
+              <a:t> </a:t>
+            </a:r>
+            <a:r>
+              <a:rPr lang="en-US" baseline="0" dirty="0" err="1" smtClean="0"/>
+              <a:t>parov</a:t>
+            </a:r>
+            <a:r>
+              <a:rPr lang="en-US" baseline="0" dirty="0" smtClean="0"/>
+              <a:t>.</a:t>
+            </a:r>
+            <a:endParaRPr lang="en-US" dirty="0"/>
+          </a:p>
+        </p:txBody>
+      </p:sp>
+      <p:sp>
+        <p:nvSpPr>
+          <p:cNvPr id="4" name="Slide Number Placeholder 3"/>
+          <p:cNvSpPr>
+            <a:spLocks noGrp="1"/>
+          </p:cNvSpPr>
+          <p:nvPr>
+            <p:ph type="sldNum" sz="quarter" idx="10"/>
+          </p:nvPr>
+        </p:nvSpPr>
+        <p:spPr/>
+        <p:txBody>
+          <a:bodyPr/>
+          <a:lstStyle/>
+          <a:p>
+            <a:fld id="{8A2CF31D-19BA-0D49-9C18-D660A2246B72}" type="slidenum">
+              <a:rPr lang="en-US" smtClean="0"/>
+              <a:t>4</a:t>
+            </a:fld>
+            <a:endParaRPr lang="en-US"/>
+          </a:p>
+        </p:txBody>
+      </p:sp>
+    </p:spTree>
+    <p:extLst>
+      <p:ext uri="{BB962C8B-B14F-4D97-AF65-F5344CB8AC3E}">
+        <p14:creationId xmlns:p14="http://schemas.microsoft.com/office/powerpoint/2010/main" val="3417802533"/>
+      </p:ext>
+    </p:extLst>
+  </p:cSld>
+  <p:clrMapOvr>
+    <a:masterClrMapping/>
+  </p:clrMapOvr>
+</p:notes>
+</file>
+
+<file path=ppt/notesSlides/notesSlide5.xml><?xml version="1.0" encoding="utf-8"?>
+<p:notes xmlns:a="http://schemas.openxmlformats.org/drawingml/2006/main" xmlns:r="http://schemas.openxmlformats.org/officeDocument/2006/relationships" xmlns:p="http://schemas.openxmlformats.org/presentationml/2006/main">
+  <p:cSld>
+    <p:spTree>
+      <p:nvGrpSpPr>
+        <p:cNvPr id="1" name=""/>
+        <p:cNvGrpSpPr/>
+        <p:nvPr/>
+      </p:nvGrpSpPr>
+      <p:grpSpPr>
+        <a:xfrm>
+          <a:off x="0" y="0"/>
+          <a:ext cx="0" cy="0"/>
+          <a:chOff x="0" y="0"/>
+          <a:chExt cx="0" cy="0"/>
+        </a:xfrm>
+      </p:grpSpPr>
+      <p:sp>
+        <p:nvSpPr>
+          <p:cNvPr id="2" name="Slide Image Placeholder 1"/>
+          <p:cNvSpPr>
+            <a:spLocks noGrp="1" noRot="1" noChangeAspect="1"/>
+          </p:cNvSpPr>
+          <p:nvPr>
+            <p:ph type="sldImg"/>
+          </p:nvPr>
+        </p:nvSpPr>
+        <p:spPr/>
+      </p:sp>
+      <p:sp>
+        <p:nvSpPr>
+          <p:cNvPr id="3" name="Notes Placeholder 2"/>
+          <p:cNvSpPr>
+            <a:spLocks noGrp="1"/>
+          </p:cNvSpPr>
+          <p:nvPr>
+            <p:ph type="body" idx="1"/>
+          </p:nvPr>
+        </p:nvSpPr>
+        <p:spPr/>
+        <p:txBody>
+          <a:bodyPr/>
+          <a:lstStyle/>
+          <a:p>
+            <a:r>
+              <a:rPr lang="en-US" dirty="0" err="1" smtClean="0"/>
+              <a:t>Teraz</a:t>
+            </a:r>
+            <a:r>
+              <a:rPr lang="en-US" dirty="0" smtClean="0"/>
+              <a:t> ked </a:t>
+            </a:r>
+            <a:r>
+              <a:rPr lang="en-US" dirty="0" err="1" smtClean="0"/>
+              <a:t>vieme</a:t>
+            </a:r>
+            <a:r>
+              <a:rPr lang="en-US" dirty="0" smtClean="0"/>
+              <a:t> co je to</a:t>
+            </a:r>
+            <a:r>
+              <a:rPr lang="en-US" baseline="0" dirty="0" smtClean="0"/>
+              <a:t> </a:t>
+            </a:r>
+            <a:r>
+              <a:rPr lang="en-US" baseline="0" dirty="0" err="1" smtClean="0"/>
+              <a:t>sekvencia</a:t>
+            </a:r>
+            <a:r>
+              <a:rPr lang="en-US" baseline="0" dirty="0" smtClean="0"/>
+              <a:t> DNA </a:t>
+            </a:r>
+            <a:r>
+              <a:rPr lang="en-US" baseline="0" dirty="0" err="1" smtClean="0"/>
+              <a:t>mozme</a:t>
+            </a:r>
+            <a:r>
+              <a:rPr lang="en-US" baseline="0" dirty="0" smtClean="0"/>
+              <a:t> </a:t>
+            </a:r>
+            <a:r>
+              <a:rPr lang="en-US" baseline="0" dirty="0" err="1" smtClean="0"/>
+              <a:t>definovat</a:t>
+            </a:r>
+            <a:r>
+              <a:rPr lang="en-US" baseline="0" dirty="0" smtClean="0"/>
+              <a:t> gen </a:t>
+            </a:r>
+            <a:r>
+              <a:rPr lang="en-US" baseline="0" dirty="0" err="1" smtClean="0"/>
+              <a:t>ako</a:t>
+            </a:r>
+            <a:r>
+              <a:rPr lang="en-US" baseline="0" dirty="0" smtClean="0"/>
+              <a:t> cast </a:t>
+            </a:r>
+            <a:r>
+              <a:rPr lang="en-US" baseline="0" dirty="0" err="1" smtClean="0"/>
+              <a:t>tejto</a:t>
+            </a:r>
+            <a:r>
+              <a:rPr lang="en-US" baseline="0" dirty="0" smtClean="0"/>
+              <a:t> </a:t>
+            </a:r>
+            <a:r>
+              <a:rPr lang="en-US" baseline="0" dirty="0" err="1" smtClean="0"/>
+              <a:t>sekvencie</a:t>
+            </a:r>
+            <a:r>
+              <a:rPr lang="en-US" baseline="0" dirty="0" smtClean="0"/>
+              <a:t>, </a:t>
+            </a:r>
+            <a:r>
+              <a:rPr lang="en-US" baseline="0" dirty="0" err="1" smtClean="0"/>
+              <a:t>ktora</a:t>
+            </a:r>
+            <a:r>
+              <a:rPr lang="en-US" baseline="0" dirty="0" smtClean="0"/>
+              <a:t> </a:t>
+            </a:r>
+            <a:r>
+              <a:rPr lang="en-US" baseline="0" dirty="0" err="1" smtClean="0"/>
+              <a:t>urcuje</a:t>
+            </a:r>
+            <a:r>
+              <a:rPr lang="en-US" baseline="0" dirty="0" smtClean="0"/>
+              <a:t> </a:t>
+            </a:r>
+            <a:r>
+              <a:rPr lang="en-US" baseline="0" dirty="0" err="1" smtClean="0"/>
+              <a:t>vlastnost</a:t>
+            </a:r>
+            <a:r>
+              <a:rPr lang="en-US" baseline="0" dirty="0" smtClean="0"/>
+              <a:t> </a:t>
+            </a:r>
+            <a:r>
+              <a:rPr lang="en-US" baseline="0" dirty="0" err="1" smtClean="0"/>
+              <a:t>jedinca</a:t>
+            </a:r>
+            <a:r>
+              <a:rPr lang="en-US" baseline="0" dirty="0" smtClean="0"/>
+              <a:t>. </a:t>
+            </a:r>
+            <a:r>
+              <a:rPr lang="en-US" baseline="0" dirty="0" err="1" smtClean="0"/>
+              <a:t>Tato</a:t>
+            </a:r>
+            <a:r>
+              <a:rPr lang="en-US" baseline="0" dirty="0" smtClean="0"/>
+              <a:t> </a:t>
+            </a:r>
+            <a:r>
+              <a:rPr lang="en-US" baseline="0" dirty="0" err="1" smtClean="0"/>
+              <a:t>vlastnost</a:t>
+            </a:r>
+            <a:r>
+              <a:rPr lang="en-US" baseline="0" dirty="0" smtClean="0"/>
+              <a:t> </a:t>
+            </a:r>
+            <a:r>
+              <a:rPr lang="en-US" baseline="0" dirty="0" err="1" smtClean="0"/>
+              <a:t>moze</a:t>
+            </a:r>
+            <a:r>
+              <a:rPr lang="en-US" baseline="0" dirty="0" smtClean="0"/>
+              <a:t> </a:t>
+            </a:r>
+            <a:r>
+              <a:rPr lang="en-US" baseline="0" dirty="0" err="1" smtClean="0"/>
+              <a:t>byt</a:t>
+            </a:r>
+            <a:r>
+              <a:rPr lang="en-US" baseline="0" dirty="0" smtClean="0"/>
+              <a:t> </a:t>
+            </a:r>
+            <a:r>
+              <a:rPr lang="en-US" baseline="0" dirty="0" err="1" smtClean="0"/>
+              <a:t>pocet</a:t>
+            </a:r>
+            <a:r>
+              <a:rPr lang="en-US" baseline="0" dirty="0" smtClean="0"/>
+              <a:t> </a:t>
+            </a:r>
+            <a:r>
+              <a:rPr lang="en-US" baseline="0" dirty="0" err="1" smtClean="0"/>
+              <a:t>ruk</a:t>
+            </a:r>
+            <a:r>
+              <a:rPr lang="en-US" baseline="0" dirty="0" smtClean="0"/>
+              <a:t>, </a:t>
+            </a:r>
+            <a:r>
+              <a:rPr lang="en-US" baseline="0" dirty="0" err="1" smtClean="0"/>
+              <a:t>farba</a:t>
+            </a:r>
+            <a:r>
+              <a:rPr lang="en-US" baseline="0" dirty="0" smtClean="0"/>
+              <a:t> </a:t>
+            </a:r>
+            <a:r>
+              <a:rPr lang="en-US" baseline="0" dirty="0" err="1" smtClean="0"/>
+              <a:t>oci</a:t>
+            </a:r>
+            <a:r>
+              <a:rPr lang="en-US" baseline="0" dirty="0" smtClean="0"/>
+              <a:t> no </a:t>
+            </a:r>
+            <a:r>
+              <a:rPr lang="en-US" baseline="0" dirty="0" err="1" smtClean="0"/>
+              <a:t>aj</a:t>
+            </a:r>
+            <a:r>
+              <a:rPr lang="en-US" baseline="0" dirty="0" smtClean="0"/>
+              <a:t> </a:t>
+            </a:r>
+            <a:r>
+              <a:rPr lang="en-US" baseline="0" dirty="0" err="1" smtClean="0"/>
+              <a:t>rychlost</a:t>
+            </a:r>
+            <a:r>
+              <a:rPr lang="en-US" baseline="0" dirty="0" smtClean="0"/>
+              <a:t> </a:t>
+            </a:r>
+            <a:r>
+              <a:rPr lang="en-US" baseline="0" dirty="0" err="1" smtClean="0"/>
+              <a:t>tvorby</a:t>
+            </a:r>
+            <a:r>
+              <a:rPr lang="en-US" baseline="0" dirty="0" smtClean="0"/>
+              <a:t> </a:t>
+            </a:r>
+            <a:r>
+              <a:rPr lang="en-US" baseline="0" dirty="0" err="1" smtClean="0"/>
+              <a:t>bielych</a:t>
+            </a:r>
+            <a:r>
+              <a:rPr lang="en-US" baseline="0" dirty="0" smtClean="0"/>
+              <a:t> </a:t>
+            </a:r>
+            <a:r>
+              <a:rPr lang="en-US" baseline="0" dirty="0" err="1" smtClean="0"/>
+              <a:t>krviniek</a:t>
+            </a:r>
+            <a:r>
+              <a:rPr lang="en-US" baseline="0" dirty="0" smtClean="0"/>
+              <a:t> </a:t>
+            </a:r>
+            <a:r>
+              <a:rPr lang="en-US" baseline="0" dirty="0" err="1" smtClean="0"/>
+              <a:t>atd</a:t>
+            </a:r>
+            <a:r>
+              <a:rPr lang="en-US" baseline="0" dirty="0" smtClean="0"/>
+              <a:t>.</a:t>
+            </a:r>
+            <a:r>
+              <a:rPr lang="en-US" dirty="0" smtClean="0"/>
+              <a:t> </a:t>
+            </a:r>
+            <a:r>
+              <a:rPr lang="en-US" dirty="0" err="1" smtClean="0"/>
+              <a:t>Dlzky</a:t>
+            </a:r>
+            <a:r>
+              <a:rPr lang="en-US" baseline="0" dirty="0" smtClean="0"/>
+              <a:t> </a:t>
+            </a:r>
+            <a:r>
+              <a:rPr lang="en-US" baseline="0" dirty="0" err="1" smtClean="0"/>
+              <a:t>genov</a:t>
+            </a:r>
+            <a:r>
+              <a:rPr lang="en-US" baseline="0" dirty="0" smtClean="0"/>
+              <a:t> </a:t>
+            </a:r>
+            <a:r>
+              <a:rPr lang="en-US" baseline="0" dirty="0" err="1" smtClean="0"/>
+              <a:t>sa</a:t>
+            </a:r>
+            <a:r>
+              <a:rPr lang="en-US" baseline="0" dirty="0" smtClean="0"/>
+              <a:t> </a:t>
+            </a:r>
+            <a:r>
+              <a:rPr lang="en-US" baseline="0" dirty="0" err="1" smtClean="0"/>
+              <a:t>pohybuju</a:t>
+            </a:r>
+            <a:r>
+              <a:rPr lang="en-US" baseline="0" dirty="0" smtClean="0"/>
+              <a:t> v </a:t>
+            </a:r>
+            <a:r>
+              <a:rPr lang="en-US" baseline="0" dirty="0" err="1" smtClean="0"/>
+              <a:t>rozmedzi</a:t>
+            </a:r>
+            <a:r>
+              <a:rPr lang="en-US" baseline="0" dirty="0" smtClean="0"/>
+              <a:t> 500 </a:t>
+            </a:r>
+            <a:r>
+              <a:rPr lang="en-US" baseline="0" dirty="0" err="1" smtClean="0"/>
+              <a:t>az</a:t>
+            </a:r>
+            <a:r>
+              <a:rPr lang="en-US" baseline="0" dirty="0" smtClean="0"/>
+              <a:t> 2,3 </a:t>
+            </a:r>
+            <a:r>
+              <a:rPr lang="en-US" baseline="0" dirty="0" err="1" smtClean="0"/>
+              <a:t>miliona</a:t>
+            </a:r>
+            <a:r>
+              <a:rPr lang="en-US" baseline="0" dirty="0" smtClean="0"/>
+              <a:t> </a:t>
+            </a:r>
+            <a:r>
+              <a:rPr lang="en-US" baseline="0" dirty="0" err="1" smtClean="0"/>
+              <a:t>bazovych</a:t>
+            </a:r>
+            <a:r>
+              <a:rPr lang="en-US" baseline="0" dirty="0" smtClean="0"/>
+              <a:t> </a:t>
+            </a:r>
+            <a:r>
+              <a:rPr lang="en-US" baseline="0" dirty="0" err="1" smtClean="0"/>
+              <a:t>parov</a:t>
+            </a:r>
+            <a:r>
+              <a:rPr lang="en-US" baseline="0" dirty="0" smtClean="0"/>
+              <a:t>. </a:t>
+            </a:r>
+            <a:r>
+              <a:rPr lang="en-US" baseline="0" dirty="0" err="1" smtClean="0"/>
+              <a:t>Vdaka</a:t>
+            </a:r>
+            <a:r>
+              <a:rPr lang="en-US" baseline="0" dirty="0" smtClean="0"/>
+              <a:t> </a:t>
+            </a:r>
+            <a:r>
+              <a:rPr lang="en-US" baseline="0" dirty="0" err="1" smtClean="0"/>
+              <a:t>dedicnosti</a:t>
+            </a:r>
+            <a:r>
+              <a:rPr lang="en-US" baseline="0" dirty="0" smtClean="0"/>
+              <a:t>, </a:t>
+            </a:r>
+            <a:r>
+              <a:rPr lang="en-US" baseline="0" dirty="0" err="1" smtClean="0"/>
+              <a:t>alebo</a:t>
+            </a:r>
+            <a:r>
+              <a:rPr lang="en-US" baseline="0" dirty="0" smtClean="0"/>
+              <a:t> </a:t>
+            </a:r>
+            <a:r>
+              <a:rPr lang="en-US" baseline="0" dirty="0" err="1" smtClean="0"/>
+              <a:t>mutacii</a:t>
+            </a:r>
+            <a:r>
+              <a:rPr lang="en-US" baseline="0" dirty="0" smtClean="0"/>
+              <a:t> </a:t>
+            </a:r>
+            <a:r>
+              <a:rPr lang="en-US" baseline="0" dirty="0" err="1" smtClean="0"/>
+              <a:t>sa</a:t>
+            </a:r>
+            <a:r>
+              <a:rPr lang="en-US" baseline="0" dirty="0" smtClean="0"/>
+              <a:t> </a:t>
+            </a:r>
+            <a:r>
+              <a:rPr lang="en-US" baseline="0" dirty="0" err="1" smtClean="0"/>
+              <a:t>moze</a:t>
+            </a:r>
+            <a:r>
+              <a:rPr lang="en-US" baseline="0" dirty="0" smtClean="0"/>
+              <a:t> </a:t>
+            </a:r>
+            <a:r>
+              <a:rPr lang="en-US" baseline="0" dirty="0" err="1" smtClean="0"/>
+              <a:t>prejav</a:t>
+            </a:r>
+            <a:r>
+              <a:rPr lang="en-US" baseline="0" dirty="0" smtClean="0"/>
+              <a:t> genu </a:t>
+            </a:r>
+            <a:r>
+              <a:rPr lang="en-US" baseline="0" dirty="0" err="1" smtClean="0"/>
+              <a:t>menit</a:t>
+            </a:r>
+            <a:r>
+              <a:rPr lang="en-US" baseline="0" dirty="0" smtClean="0"/>
+              <a:t>. </a:t>
+            </a:r>
+            <a:r>
+              <a:rPr lang="en-US" baseline="0" dirty="0" err="1" smtClean="0"/>
+              <a:t>Existuje</a:t>
+            </a:r>
+            <a:r>
+              <a:rPr lang="en-US" baseline="0" dirty="0" smtClean="0"/>
+              <a:t> 30 </a:t>
+            </a:r>
+            <a:r>
+              <a:rPr lang="en-US" baseline="0" dirty="0" err="1" smtClean="0"/>
+              <a:t>mutacii</a:t>
+            </a:r>
+            <a:r>
+              <a:rPr lang="en-US" baseline="0" dirty="0" smtClean="0"/>
+              <a:t>, co je </a:t>
+            </a:r>
+            <a:r>
+              <a:rPr lang="en-US" baseline="0" dirty="0" err="1" smtClean="0"/>
+              <a:t>zmena</a:t>
+            </a:r>
+            <a:r>
+              <a:rPr lang="en-US" baseline="0" dirty="0" smtClean="0"/>
+              <a:t> 1 </a:t>
+            </a:r>
+            <a:r>
+              <a:rPr lang="en-US" baseline="0" dirty="0" err="1" smtClean="0"/>
+              <a:t>alebo</a:t>
+            </a:r>
+            <a:r>
+              <a:rPr lang="en-US" baseline="0" dirty="0" smtClean="0"/>
+              <a:t> </a:t>
+            </a:r>
+            <a:r>
+              <a:rPr lang="en-US" baseline="0" dirty="0" err="1" smtClean="0"/>
+              <a:t>viacerych</a:t>
+            </a:r>
+            <a:r>
+              <a:rPr lang="en-US" baseline="0" dirty="0" smtClean="0"/>
+              <a:t> </a:t>
+            </a:r>
+            <a:r>
+              <a:rPr lang="en-US" baseline="0" dirty="0" err="1" smtClean="0"/>
+              <a:t>nukleotidovych</a:t>
+            </a:r>
+            <a:r>
+              <a:rPr lang="en-US" baseline="0" dirty="0" smtClean="0"/>
+              <a:t> </a:t>
+            </a:r>
+            <a:r>
+              <a:rPr lang="en-US" baseline="0" dirty="0" err="1" smtClean="0"/>
+              <a:t>parov</a:t>
+            </a:r>
+            <a:r>
+              <a:rPr lang="en-US" baseline="0" dirty="0" smtClean="0"/>
+              <a:t> </a:t>
+            </a:r>
+            <a:r>
+              <a:rPr lang="en-US" baseline="0" dirty="0" err="1" smtClean="0"/>
+              <a:t>jedineho</a:t>
+            </a:r>
+            <a:r>
+              <a:rPr lang="en-US" baseline="0" dirty="0" smtClean="0"/>
+              <a:t> genu </a:t>
+            </a:r>
+            <a:r>
+              <a:rPr lang="en-US" baseline="0" dirty="0" err="1" smtClean="0"/>
+              <a:t>zabezpecujuceho</a:t>
+            </a:r>
+            <a:r>
+              <a:rPr lang="en-US" baseline="0" dirty="0" smtClean="0"/>
+              <a:t> </a:t>
+            </a:r>
+            <a:r>
+              <a:rPr lang="en-US" baseline="0" dirty="0" err="1" smtClean="0"/>
+              <a:t>svetlocitlivost</a:t>
+            </a:r>
+            <a:r>
+              <a:rPr lang="en-US" baseline="0" dirty="0" smtClean="0"/>
+              <a:t> </a:t>
+            </a:r>
+            <a:r>
+              <a:rPr lang="en-US" baseline="0" dirty="0" err="1" smtClean="0"/>
+              <a:t>ktore</a:t>
+            </a:r>
+            <a:r>
+              <a:rPr lang="en-US" baseline="0" dirty="0" smtClean="0"/>
+              <a:t> </a:t>
+            </a:r>
+            <a:r>
+              <a:rPr lang="en-US" baseline="0" dirty="0" err="1" smtClean="0"/>
+              <a:t>maju</a:t>
+            </a:r>
+            <a:r>
+              <a:rPr lang="en-US" baseline="0" dirty="0" smtClean="0"/>
+              <a:t> </a:t>
+            </a:r>
+            <a:r>
+              <a:rPr lang="en-US" baseline="0" dirty="0" err="1" smtClean="0"/>
+              <a:t>za</a:t>
+            </a:r>
+            <a:r>
+              <a:rPr lang="en-US" baseline="0" dirty="0" smtClean="0"/>
+              <a:t> </a:t>
+            </a:r>
+            <a:r>
+              <a:rPr lang="en-US" baseline="0" dirty="0" err="1" smtClean="0"/>
+              <a:t>nasledok</a:t>
+            </a:r>
+            <a:r>
+              <a:rPr lang="en-US" baseline="0" dirty="0" smtClean="0"/>
+              <a:t> </a:t>
+            </a:r>
+            <a:r>
+              <a:rPr lang="en-US" baseline="0" dirty="0" err="1" smtClean="0"/>
+              <a:t>rozne</a:t>
+            </a:r>
+            <a:r>
+              <a:rPr lang="en-US" baseline="0" dirty="0" smtClean="0"/>
+              <a:t> </a:t>
+            </a:r>
+            <a:r>
+              <a:rPr lang="en-US" baseline="0" dirty="0" err="1" smtClean="0"/>
+              <a:t>urovne</a:t>
+            </a:r>
+            <a:r>
+              <a:rPr lang="en-US" baseline="0" dirty="0" smtClean="0"/>
+              <a:t> </a:t>
+            </a:r>
+            <a:r>
+              <a:rPr lang="en-US" baseline="0" dirty="0" err="1" smtClean="0"/>
+              <a:t>seroslepoty</a:t>
+            </a:r>
+            <a:r>
+              <a:rPr lang="en-US" baseline="0" dirty="0" smtClean="0"/>
+              <a:t>.</a:t>
+            </a:r>
+            <a:endParaRPr lang="en-US" dirty="0"/>
+          </a:p>
+        </p:txBody>
+      </p:sp>
+      <p:sp>
+        <p:nvSpPr>
+          <p:cNvPr id="4" name="Slide Number Placeholder 3"/>
+          <p:cNvSpPr>
+            <a:spLocks noGrp="1"/>
+          </p:cNvSpPr>
+          <p:nvPr>
+            <p:ph type="sldNum" sz="quarter" idx="10"/>
+          </p:nvPr>
+        </p:nvSpPr>
+        <p:spPr/>
+        <p:txBody>
+          <a:bodyPr/>
+          <a:lstStyle/>
+          <a:p>
+            <a:fld id="{8A2CF31D-19BA-0D49-9C18-D660A2246B72}" type="slidenum">
+              <a:rPr lang="en-US" smtClean="0"/>
+              <a:t>5</a:t>
+            </a:fld>
+            <a:endParaRPr lang="en-US"/>
+          </a:p>
+        </p:txBody>
+      </p:sp>
+    </p:spTree>
+    <p:extLst>
+      <p:ext uri="{BB962C8B-B14F-4D97-AF65-F5344CB8AC3E}">
+        <p14:creationId xmlns:p14="http://schemas.microsoft.com/office/powerpoint/2010/main" val="3356343109"/>
+      </p:ext>
+    </p:extLst>
+  </p:cSld>
+  <p:clrMapOvr>
+    <a:masterClrMapping/>
+  </p:clrMapOvr>
+</p:notes>
+</file>
+
+<file path=ppt/notesSlides/notesSlide6.xml><?xml version="1.0" encoding="utf-8"?>
+<p:notes xmlns:a="http://schemas.openxmlformats.org/drawingml/2006/main" xmlns:r="http://schemas.openxmlformats.org/officeDocument/2006/relationships" xmlns:p="http://schemas.openxmlformats.org/presentationml/2006/main">
+  <p:cSld>
+    <p:spTree>
+      <p:nvGrpSpPr>
+        <p:cNvPr id="1" name=""/>
+        <p:cNvGrpSpPr/>
+        <p:nvPr/>
+      </p:nvGrpSpPr>
+      <p:grpSpPr>
+        <a:xfrm>
+          <a:off x="0" y="0"/>
+          <a:ext cx="0" cy="0"/>
+          <a:chOff x="0" y="0"/>
+          <a:chExt cx="0" cy="0"/>
+        </a:xfrm>
+      </p:grpSpPr>
+      <p:sp>
+        <p:nvSpPr>
+          <p:cNvPr id="2" name="Slide Image Placeholder 1"/>
+          <p:cNvSpPr>
+            <a:spLocks noGrp="1" noRot="1" noChangeAspect="1"/>
+          </p:cNvSpPr>
+          <p:nvPr>
+            <p:ph type="sldImg"/>
+          </p:nvPr>
+        </p:nvSpPr>
+        <p:spPr/>
+      </p:sp>
+      <p:sp>
+        <p:nvSpPr>
+          <p:cNvPr id="3" name="Notes Placeholder 2"/>
+          <p:cNvSpPr>
+            <a:spLocks noGrp="1"/>
+          </p:cNvSpPr>
+          <p:nvPr>
+            <p:ph type="body" idx="1"/>
+          </p:nvPr>
+        </p:nvSpPr>
+        <p:spPr/>
+        <p:txBody>
+          <a:bodyPr/>
+          <a:lstStyle/>
+          <a:p>
+            <a:r>
+              <a:rPr lang="en-US" dirty="0" smtClean="0"/>
+              <a:t>Human Genome Project </a:t>
+            </a:r>
+            <a:r>
+              <a:rPr lang="en-US" dirty="0" err="1" smtClean="0"/>
+              <a:t>bol</a:t>
+            </a:r>
+            <a:r>
+              <a:rPr lang="en-US" dirty="0" smtClean="0"/>
+              <a:t> </a:t>
+            </a:r>
+            <a:r>
+              <a:rPr lang="en-US" dirty="0" err="1" smtClean="0"/>
+              <a:t>najrozsiahlejsi</a:t>
+            </a:r>
+            <a:r>
+              <a:rPr lang="en-US" dirty="0" smtClean="0"/>
+              <a:t> </a:t>
+            </a:r>
+            <a:r>
+              <a:rPr lang="en-US" dirty="0" err="1" smtClean="0"/>
+              <a:t>projekt</a:t>
+            </a:r>
+            <a:r>
+              <a:rPr lang="en-US" dirty="0" smtClean="0"/>
+              <a:t> </a:t>
+            </a:r>
+            <a:r>
+              <a:rPr lang="en-US" dirty="0" err="1" smtClean="0"/>
+              <a:t>zamerany</a:t>
+            </a:r>
+            <a:r>
+              <a:rPr lang="en-US" baseline="0" dirty="0" smtClean="0"/>
+              <a:t> </a:t>
+            </a:r>
+            <a:r>
+              <a:rPr lang="en-US" baseline="0" dirty="0" err="1" smtClean="0"/>
+              <a:t>na</a:t>
+            </a:r>
+            <a:r>
+              <a:rPr lang="en-US" baseline="0" dirty="0" smtClean="0"/>
+              <a:t> </a:t>
+            </a:r>
+            <a:r>
+              <a:rPr lang="en-US" baseline="0" dirty="0" err="1" smtClean="0"/>
+              <a:t>vyskum</a:t>
+            </a:r>
+            <a:r>
+              <a:rPr lang="en-US" baseline="0" dirty="0" smtClean="0"/>
+              <a:t> </a:t>
+            </a:r>
+            <a:r>
+              <a:rPr lang="en-US" baseline="0" dirty="0" err="1" smtClean="0"/>
+              <a:t>genotypu</a:t>
+            </a:r>
+            <a:r>
+              <a:rPr lang="en-US" baseline="0" dirty="0" smtClean="0"/>
+              <a:t> </a:t>
+            </a:r>
+            <a:r>
+              <a:rPr lang="en-US" baseline="0" dirty="0" err="1" smtClean="0"/>
+              <a:t>cloveka</a:t>
+            </a:r>
+            <a:r>
+              <a:rPr lang="en-US" baseline="0" dirty="0" smtClean="0"/>
+              <a:t>. V </a:t>
+            </a:r>
+            <a:r>
+              <a:rPr lang="en-US" baseline="0" dirty="0" err="1" smtClean="0"/>
+              <a:t>podstate</a:t>
+            </a:r>
+            <a:r>
+              <a:rPr lang="en-US" baseline="0" dirty="0" smtClean="0"/>
+              <a:t> </a:t>
+            </a:r>
+            <a:r>
+              <a:rPr lang="en-US" baseline="0" dirty="0" err="1" smtClean="0"/>
+              <a:t>zadanim</a:t>
+            </a:r>
+            <a:r>
+              <a:rPr lang="en-US" baseline="0" dirty="0" smtClean="0"/>
+              <a:t> bolo </a:t>
+            </a:r>
+            <a:r>
+              <a:rPr lang="en-US" baseline="0" dirty="0" err="1" smtClean="0"/>
+              <a:t>najst</a:t>
+            </a:r>
+            <a:r>
+              <a:rPr lang="en-US" baseline="0" dirty="0" smtClean="0"/>
+              <a:t> a </a:t>
+            </a:r>
+            <a:r>
+              <a:rPr lang="en-US" baseline="0" dirty="0" err="1" smtClean="0"/>
+              <a:t>zdokumentovat</a:t>
+            </a:r>
+            <a:r>
+              <a:rPr lang="en-US" baseline="0" dirty="0" smtClean="0"/>
+              <a:t> </a:t>
+            </a:r>
+            <a:r>
+              <a:rPr lang="en-US" baseline="0" dirty="0" err="1" smtClean="0"/>
+              <a:t>vsetky</a:t>
+            </a:r>
+            <a:r>
+              <a:rPr lang="en-US" baseline="0" dirty="0" smtClean="0"/>
+              <a:t> </a:t>
+            </a:r>
+            <a:r>
+              <a:rPr lang="en-US" baseline="0" dirty="0" err="1" smtClean="0"/>
+              <a:t>ludske</a:t>
+            </a:r>
+            <a:r>
+              <a:rPr lang="en-US" baseline="0" dirty="0" smtClean="0"/>
+              <a:t> </a:t>
+            </a:r>
+            <a:r>
+              <a:rPr lang="en-US" baseline="0" dirty="0" err="1" smtClean="0"/>
+              <a:t>geny</a:t>
+            </a:r>
+            <a:r>
+              <a:rPr lang="en-US" baseline="0" dirty="0" smtClean="0"/>
+              <a:t>, </a:t>
+            </a:r>
+            <a:r>
+              <a:rPr lang="en-US" baseline="0" dirty="0" err="1" smtClean="0"/>
+              <a:t>trval</a:t>
+            </a:r>
+            <a:r>
+              <a:rPr lang="en-US" baseline="0" dirty="0" smtClean="0"/>
+              <a:t> 10 </a:t>
+            </a:r>
+            <a:r>
+              <a:rPr lang="en-US" baseline="0" dirty="0" err="1" smtClean="0"/>
+              <a:t>rokov</a:t>
+            </a:r>
+            <a:r>
+              <a:rPr lang="en-US" baseline="0" dirty="0" smtClean="0"/>
+              <a:t> a </a:t>
+            </a:r>
+            <a:r>
+              <a:rPr lang="en-US" baseline="0" dirty="0" err="1" smtClean="0"/>
+              <a:t>vynalozilo</a:t>
+            </a:r>
+            <a:r>
+              <a:rPr lang="en-US" baseline="0" dirty="0" smtClean="0"/>
+              <a:t> </a:t>
+            </a:r>
+            <a:r>
+              <a:rPr lang="en-US" baseline="0" dirty="0" err="1" smtClean="0"/>
+              <a:t>sa</a:t>
+            </a:r>
+            <a:r>
+              <a:rPr lang="en-US" baseline="0" dirty="0" smtClean="0"/>
+              <a:t> </a:t>
+            </a:r>
+            <a:r>
+              <a:rPr lang="en-US" baseline="0" dirty="0" err="1" smtClean="0"/>
+              <a:t>na</a:t>
+            </a:r>
+            <a:r>
+              <a:rPr lang="en-US" baseline="0" dirty="0" smtClean="0"/>
+              <a:t> </a:t>
+            </a:r>
+            <a:r>
+              <a:rPr lang="en-US" baseline="0" dirty="0" err="1" smtClean="0"/>
+              <a:t>neho</a:t>
+            </a:r>
+            <a:r>
+              <a:rPr lang="en-US" baseline="0" dirty="0" smtClean="0"/>
+              <a:t> 3 </a:t>
+            </a:r>
+            <a:r>
+              <a:rPr lang="en-US" baseline="0" dirty="0" err="1" smtClean="0"/>
+              <a:t>miliardy</a:t>
+            </a:r>
+            <a:r>
+              <a:rPr lang="en-US" baseline="0" dirty="0" smtClean="0"/>
+              <a:t> </a:t>
+            </a:r>
+            <a:r>
+              <a:rPr lang="en-US" baseline="0" dirty="0" err="1" smtClean="0"/>
+              <a:t>dolarov</a:t>
+            </a:r>
+            <a:r>
+              <a:rPr lang="en-US" baseline="0" dirty="0" smtClean="0"/>
+              <a:t>. Je </a:t>
+            </a:r>
+            <a:r>
+              <a:rPr lang="en-US" baseline="0" dirty="0" err="1" smtClean="0"/>
+              <a:t>neuveritelne</a:t>
+            </a:r>
+            <a:r>
+              <a:rPr lang="en-US" baseline="0" dirty="0" smtClean="0"/>
+              <a:t> </a:t>
+            </a:r>
+            <a:r>
+              <a:rPr lang="en-US" baseline="0" dirty="0" err="1" smtClean="0"/>
+              <a:t>ako</a:t>
+            </a:r>
+            <a:r>
+              <a:rPr lang="en-US" baseline="0" dirty="0" smtClean="0"/>
+              <a:t> </a:t>
+            </a:r>
+            <a:r>
+              <a:rPr lang="en-US" baseline="0" dirty="0" err="1" smtClean="0"/>
+              <a:t>objasnil</a:t>
+            </a:r>
+            <a:r>
+              <a:rPr lang="en-US" baseline="0" dirty="0" smtClean="0"/>
+              <a:t> </a:t>
+            </a:r>
+            <a:r>
+              <a:rPr lang="en-US" baseline="0" dirty="0" err="1" smtClean="0"/>
+              <a:t>zahady</a:t>
+            </a:r>
+            <a:r>
+              <a:rPr lang="en-US" baseline="0" dirty="0" smtClean="0"/>
+              <a:t> DNA </a:t>
+            </a:r>
+            <a:r>
+              <a:rPr lang="en-US" baseline="0" dirty="0" err="1" smtClean="0"/>
+              <a:t>lebo</a:t>
+            </a:r>
+            <a:r>
+              <a:rPr lang="en-US" baseline="0" dirty="0" smtClean="0"/>
+              <a:t> </a:t>
+            </a:r>
+            <a:r>
+              <a:rPr lang="en-US" baseline="0" dirty="0" err="1" smtClean="0"/>
+              <a:t>pred</a:t>
+            </a:r>
+            <a:r>
+              <a:rPr lang="en-US" baseline="0" dirty="0" smtClean="0"/>
+              <a:t> </a:t>
+            </a:r>
+            <a:r>
+              <a:rPr lang="en-US" baseline="0" dirty="0" err="1" smtClean="0"/>
+              <a:t>tym</a:t>
+            </a:r>
+            <a:r>
+              <a:rPr lang="en-US" baseline="0" dirty="0" smtClean="0"/>
+              <a:t> </a:t>
+            </a:r>
+            <a:r>
+              <a:rPr lang="en-US" baseline="0" dirty="0" err="1" smtClean="0"/>
+              <a:t>sa</a:t>
+            </a:r>
+            <a:r>
+              <a:rPr lang="en-US" baseline="0" dirty="0" smtClean="0"/>
+              <a:t> </a:t>
+            </a:r>
+            <a:r>
+              <a:rPr lang="en-US" baseline="0" dirty="0" err="1" smtClean="0"/>
+              <a:t>odhadovalo</a:t>
+            </a:r>
+            <a:r>
+              <a:rPr lang="en-US" baseline="0" dirty="0" smtClean="0"/>
+              <a:t> </a:t>
+            </a:r>
+            <a:r>
+              <a:rPr lang="en-US" baseline="0" dirty="0" err="1" smtClean="0"/>
+              <a:t>ze</a:t>
+            </a:r>
+            <a:r>
+              <a:rPr lang="en-US" baseline="0" dirty="0" smtClean="0"/>
+              <a:t> </a:t>
+            </a:r>
+            <a:r>
+              <a:rPr lang="en-US" baseline="0" dirty="0" err="1" smtClean="0"/>
+              <a:t>ludsky</a:t>
+            </a:r>
+            <a:r>
+              <a:rPr lang="en-US" baseline="0" dirty="0" smtClean="0"/>
+              <a:t> </a:t>
+            </a:r>
+            <a:r>
+              <a:rPr lang="en-US" baseline="0" dirty="0" err="1" smtClean="0"/>
+              <a:t>genotyp</a:t>
+            </a:r>
+            <a:r>
+              <a:rPr lang="en-US" baseline="0" dirty="0" smtClean="0"/>
+              <a:t> ma 100 000 </a:t>
+            </a:r>
+            <a:r>
+              <a:rPr lang="en-US" baseline="0" dirty="0" err="1" smtClean="0"/>
+              <a:t>genov</a:t>
+            </a:r>
+            <a:r>
+              <a:rPr lang="en-US" baseline="0" dirty="0" smtClean="0"/>
+              <a:t> no </a:t>
+            </a:r>
+            <a:r>
+              <a:rPr lang="en-US" baseline="0" dirty="0" err="1" smtClean="0"/>
+              <a:t>projekt</a:t>
+            </a:r>
+            <a:r>
+              <a:rPr lang="en-US" baseline="0" dirty="0" smtClean="0"/>
+              <a:t> </a:t>
+            </a:r>
+            <a:r>
+              <a:rPr lang="en-US" baseline="0" dirty="0" err="1" smtClean="0"/>
+              <a:t>dokazal</a:t>
+            </a:r>
+            <a:r>
+              <a:rPr lang="en-US" baseline="0" dirty="0" smtClean="0"/>
+              <a:t> </a:t>
+            </a:r>
+            <a:r>
+              <a:rPr lang="en-US" baseline="0" dirty="0" err="1" smtClean="0"/>
+              <a:t>ze</a:t>
+            </a:r>
+            <a:r>
+              <a:rPr lang="en-US" baseline="0" dirty="0" smtClean="0"/>
+              <a:t> </a:t>
+            </a:r>
+            <a:r>
+              <a:rPr lang="en-US" baseline="0" dirty="0" err="1" smtClean="0"/>
+              <a:t>ich</a:t>
+            </a:r>
+            <a:r>
+              <a:rPr lang="en-US" baseline="0" dirty="0" smtClean="0"/>
+              <a:t> je </a:t>
+            </a:r>
+            <a:r>
+              <a:rPr lang="en-US" baseline="0" dirty="0" err="1" smtClean="0"/>
+              <a:t>okolo</a:t>
+            </a:r>
+            <a:r>
+              <a:rPr lang="en-US" baseline="0" dirty="0" smtClean="0"/>
+              <a:t> 21 </a:t>
+            </a:r>
+            <a:r>
+              <a:rPr lang="en-US" baseline="0" dirty="0" err="1" smtClean="0"/>
+              <a:t>tisic</a:t>
+            </a:r>
+            <a:r>
+              <a:rPr lang="en-US" baseline="0" dirty="0" smtClean="0"/>
+              <a:t>. </a:t>
+            </a:r>
+            <a:r>
+              <a:rPr lang="en-US" baseline="0" dirty="0" err="1" smtClean="0"/>
+              <a:t>Tieto</a:t>
+            </a:r>
+            <a:r>
+              <a:rPr lang="en-US" baseline="0" dirty="0" smtClean="0"/>
+              <a:t> </a:t>
+            </a:r>
+            <a:r>
+              <a:rPr lang="en-US" baseline="0" dirty="0" err="1" smtClean="0"/>
+              <a:t>poznatky</a:t>
+            </a:r>
+            <a:r>
+              <a:rPr lang="en-US" baseline="0" dirty="0" smtClean="0"/>
+              <a:t> </a:t>
+            </a:r>
+            <a:r>
+              <a:rPr lang="en-US" baseline="0" dirty="0" err="1" smtClean="0"/>
+              <a:t>su</a:t>
+            </a:r>
+            <a:r>
+              <a:rPr lang="en-US" baseline="0" dirty="0" smtClean="0"/>
+              <a:t> </a:t>
+            </a:r>
+            <a:r>
+              <a:rPr lang="en-US" baseline="0" dirty="0" err="1" smtClean="0"/>
+              <a:t>dostupne</a:t>
+            </a:r>
+            <a:r>
+              <a:rPr lang="en-US" baseline="0" dirty="0" smtClean="0"/>
+              <a:t> z </a:t>
+            </a:r>
+            <a:r>
+              <a:rPr lang="en-US" baseline="0" dirty="0" err="1" smtClean="0"/>
+              <a:t>roznych</a:t>
+            </a:r>
+            <a:r>
+              <a:rPr lang="en-US" baseline="0" dirty="0" smtClean="0"/>
+              <a:t> </a:t>
+            </a:r>
+            <a:r>
+              <a:rPr lang="en-US" baseline="0" dirty="0" err="1" smtClean="0"/>
+              <a:t>databaz</a:t>
+            </a:r>
+            <a:r>
+              <a:rPr lang="en-US" baseline="0" dirty="0" smtClean="0"/>
+              <a:t> a </a:t>
+            </a:r>
+            <a:r>
+              <a:rPr lang="en-US" baseline="0" dirty="0" err="1" smtClean="0"/>
+              <a:t>na</a:t>
+            </a:r>
+            <a:r>
+              <a:rPr lang="en-US" baseline="0" dirty="0" smtClean="0"/>
+              <a:t> </a:t>
+            </a:r>
+            <a:r>
+              <a:rPr lang="en-US" baseline="0" dirty="0" err="1" smtClean="0"/>
+              <a:t>pristup</a:t>
+            </a:r>
+            <a:r>
+              <a:rPr lang="en-US" baseline="0" dirty="0" smtClean="0"/>
+              <a:t> </a:t>
+            </a:r>
+            <a:r>
+              <a:rPr lang="en-US" baseline="0" dirty="0" err="1" smtClean="0"/>
+              <a:t>sa</a:t>
+            </a:r>
+            <a:r>
+              <a:rPr lang="en-US" baseline="0" dirty="0" smtClean="0"/>
+              <a:t> </a:t>
+            </a:r>
+            <a:r>
+              <a:rPr lang="en-US" baseline="0" dirty="0" err="1" smtClean="0"/>
+              <a:t>pouzivaju</a:t>
+            </a:r>
+            <a:r>
+              <a:rPr lang="en-US" baseline="0" dirty="0" smtClean="0"/>
+              <a:t> </a:t>
+            </a:r>
+            <a:r>
+              <a:rPr lang="en-US" baseline="0" dirty="0" err="1" smtClean="0"/>
+              <a:t>takzvane</a:t>
+            </a:r>
+            <a:r>
+              <a:rPr lang="en-US" baseline="0" dirty="0" smtClean="0"/>
+              <a:t> genome browsers.</a:t>
+            </a:r>
+            <a:endParaRPr lang="en-US" dirty="0"/>
+          </a:p>
+        </p:txBody>
+      </p:sp>
+      <p:sp>
+        <p:nvSpPr>
+          <p:cNvPr id="4" name="Slide Number Placeholder 3"/>
+          <p:cNvSpPr>
+            <a:spLocks noGrp="1"/>
+          </p:cNvSpPr>
+          <p:nvPr>
+            <p:ph type="sldNum" sz="quarter" idx="10"/>
+          </p:nvPr>
+        </p:nvSpPr>
+        <p:spPr/>
+        <p:txBody>
+          <a:bodyPr/>
+          <a:lstStyle/>
+          <a:p>
+            <a:fld id="{8A2CF31D-19BA-0D49-9C18-D660A2246B72}" type="slidenum">
+              <a:rPr lang="en-US" smtClean="0"/>
+              <a:t>6</a:t>
+            </a:fld>
+            <a:endParaRPr lang="en-US"/>
+          </a:p>
+        </p:txBody>
+      </p:sp>
+    </p:spTree>
+    <p:extLst>
+      <p:ext uri="{BB962C8B-B14F-4D97-AF65-F5344CB8AC3E}">
+        <p14:creationId xmlns:p14="http://schemas.microsoft.com/office/powerpoint/2010/main" val="3192541099"/>
+      </p:ext>
+    </p:extLst>
+  </p:cSld>
+  <p:clrMapOvr>
+    <a:masterClrMapping/>
+  </p:clrMapOvr>
+</p:notes>
+</file>
+
+<file path=ppt/notesSlides/notesSlide7.xml><?xml version="1.0" encoding="utf-8"?>
+<p:notes xmlns:a="http://schemas.openxmlformats.org/drawingml/2006/main" xmlns:r="http://schemas.openxmlformats.org/officeDocument/2006/relationships" xmlns:p="http://schemas.openxmlformats.org/presentationml/2006/main">
+  <p:cSld>
+    <p:spTree>
+      <p:nvGrpSpPr>
+        <p:cNvPr id="1" name=""/>
+        <p:cNvGrpSpPr/>
+        <p:nvPr/>
+      </p:nvGrpSpPr>
+      <p:grpSpPr>
+        <a:xfrm>
+          <a:off x="0" y="0"/>
+          <a:ext cx="0" cy="0"/>
+          <a:chOff x="0" y="0"/>
+          <a:chExt cx="0" cy="0"/>
+        </a:xfrm>
+      </p:grpSpPr>
+      <p:sp>
+        <p:nvSpPr>
+          <p:cNvPr id="2" name="Slide Image Placeholder 1"/>
+          <p:cNvSpPr>
+            <a:spLocks noGrp="1" noRot="1" noChangeAspect="1"/>
+          </p:cNvSpPr>
+          <p:nvPr>
+            <p:ph type="sldImg"/>
+          </p:nvPr>
+        </p:nvSpPr>
+        <p:spPr/>
+      </p:sp>
+      <p:sp>
+        <p:nvSpPr>
+          <p:cNvPr id="3" name="Notes Placeholder 2"/>
+          <p:cNvSpPr>
+            <a:spLocks noGrp="1"/>
+          </p:cNvSpPr>
+          <p:nvPr>
+            <p:ph type="body" idx="1"/>
+          </p:nvPr>
+        </p:nvSpPr>
+        <p:spPr/>
+        <p:txBody>
+          <a:bodyPr/>
+          <a:lstStyle/>
+          <a:p>
+            <a:r>
+              <a:rPr lang="en-US" dirty="0" err="1" smtClean="0"/>
+              <a:t>Myslim</a:t>
+            </a:r>
+            <a:r>
+              <a:rPr lang="en-US" dirty="0" smtClean="0"/>
+              <a:t> </a:t>
+            </a:r>
+            <a:r>
+              <a:rPr lang="en-US" dirty="0" err="1" smtClean="0"/>
+              <a:t>si</a:t>
+            </a:r>
+            <a:r>
+              <a:rPr lang="en-US" dirty="0" smtClean="0"/>
+              <a:t>, </a:t>
+            </a:r>
+            <a:r>
+              <a:rPr lang="en-US" dirty="0" err="1" smtClean="0"/>
+              <a:t>ze</a:t>
+            </a:r>
+            <a:r>
+              <a:rPr lang="en-US" dirty="0" smtClean="0"/>
+              <a:t> je </a:t>
+            </a:r>
+            <a:r>
+              <a:rPr lang="en-US" dirty="0" err="1" smtClean="0"/>
+              <a:t>kazdemu</a:t>
+            </a:r>
+            <a:r>
+              <a:rPr lang="en-US" dirty="0" smtClean="0"/>
+              <a:t> </a:t>
+            </a:r>
+            <a:r>
+              <a:rPr lang="en-US" dirty="0" err="1" smtClean="0"/>
+              <a:t>jasne</a:t>
+            </a:r>
+            <a:r>
+              <a:rPr lang="en-US" dirty="0" smtClean="0"/>
+              <a:t> </a:t>
+            </a:r>
+            <a:r>
+              <a:rPr lang="en-US" dirty="0" err="1" smtClean="0"/>
+              <a:t>ze</a:t>
+            </a:r>
+            <a:r>
+              <a:rPr lang="en-US" dirty="0" smtClean="0"/>
+              <a:t> </a:t>
+            </a:r>
+            <a:r>
+              <a:rPr lang="en-US" dirty="0" err="1" smtClean="0"/>
+              <a:t>urcenie</a:t>
+            </a:r>
+            <a:r>
+              <a:rPr lang="en-US" dirty="0" smtClean="0"/>
+              <a:t> </a:t>
+            </a:r>
+            <a:r>
+              <a:rPr lang="en-US" dirty="0" err="1" smtClean="0"/>
+              <a:t>urciteho</a:t>
+            </a:r>
+            <a:r>
+              <a:rPr lang="en-US" dirty="0" smtClean="0"/>
+              <a:t> genu je </a:t>
+            </a:r>
+            <a:r>
+              <a:rPr lang="en-US" dirty="0" err="1" smtClean="0"/>
+              <a:t>vlastne</a:t>
+            </a:r>
+            <a:r>
+              <a:rPr lang="en-US" dirty="0" smtClean="0"/>
+              <a:t> </a:t>
+            </a:r>
+            <a:r>
+              <a:rPr lang="en-US" dirty="0" err="1" smtClean="0"/>
+              <a:t>riesenie</a:t>
+            </a:r>
+            <a:r>
+              <a:rPr lang="en-US" dirty="0" smtClean="0"/>
+              <a:t> </a:t>
+            </a:r>
+            <a:r>
+              <a:rPr lang="en-US" dirty="0" err="1" smtClean="0"/>
+              <a:t>regularneho</a:t>
+            </a:r>
+            <a:r>
+              <a:rPr lang="en-US" baseline="0" dirty="0" smtClean="0"/>
+              <a:t> </a:t>
+            </a:r>
+            <a:r>
+              <a:rPr lang="en-US" baseline="0" dirty="0" err="1" smtClean="0"/>
+              <a:t>vyrazu</a:t>
+            </a:r>
+            <a:r>
+              <a:rPr lang="en-US" baseline="0" dirty="0" smtClean="0"/>
+              <a:t>. </a:t>
+            </a:r>
+            <a:r>
+              <a:rPr lang="en-US" baseline="0" dirty="0" err="1" smtClean="0"/>
+              <a:t>Prave</a:t>
+            </a:r>
+            <a:r>
+              <a:rPr lang="en-US" baseline="0" dirty="0" smtClean="0"/>
+              <a:t> </a:t>
+            </a:r>
+            <a:r>
+              <a:rPr lang="en-US" baseline="0" dirty="0" err="1" smtClean="0"/>
+              <a:t>na</a:t>
+            </a:r>
+            <a:r>
+              <a:rPr lang="en-US" baseline="0" dirty="0" smtClean="0"/>
+              <a:t> </a:t>
+            </a:r>
+            <a:r>
+              <a:rPr lang="en-US" baseline="0" dirty="0" err="1" smtClean="0"/>
+              <a:t>tento</a:t>
+            </a:r>
+            <a:r>
+              <a:rPr lang="en-US" baseline="0" dirty="0" smtClean="0"/>
+              <a:t> </a:t>
+            </a:r>
+            <a:r>
+              <a:rPr lang="en-US" baseline="0" dirty="0" err="1" smtClean="0"/>
+              <a:t>ucel</a:t>
+            </a:r>
+            <a:r>
+              <a:rPr lang="en-US" baseline="0" dirty="0" smtClean="0"/>
+              <a:t> </a:t>
+            </a:r>
+            <a:r>
+              <a:rPr lang="en-US" baseline="0" dirty="0" err="1" smtClean="0"/>
+              <a:t>su</a:t>
+            </a:r>
+            <a:r>
+              <a:rPr lang="en-US" baseline="0" dirty="0" smtClean="0"/>
+              <a:t> </a:t>
+            </a:r>
+            <a:r>
+              <a:rPr lang="en-US" baseline="0" dirty="0" err="1" smtClean="0"/>
+              <a:t>najidealnejsie</a:t>
+            </a:r>
+            <a:r>
+              <a:rPr lang="en-US" baseline="0" dirty="0" smtClean="0"/>
+              <a:t> </a:t>
+            </a:r>
+            <a:r>
+              <a:rPr lang="en-US" baseline="0" dirty="0" err="1" smtClean="0"/>
+              <a:t>Konecne</a:t>
+            </a:r>
+            <a:r>
+              <a:rPr lang="en-US" baseline="0" dirty="0" smtClean="0"/>
+              <a:t> </a:t>
+            </a:r>
+            <a:r>
+              <a:rPr lang="en-US" baseline="0" dirty="0" err="1" smtClean="0"/>
+              <a:t>akceptory</a:t>
+            </a:r>
+            <a:r>
+              <a:rPr lang="en-US" baseline="0" dirty="0" smtClean="0"/>
+              <a:t>, </a:t>
+            </a:r>
+            <a:r>
+              <a:rPr lang="en-US" baseline="0" dirty="0" err="1" smtClean="0"/>
+              <a:t>kde</a:t>
+            </a:r>
+            <a:r>
+              <a:rPr lang="en-US" baseline="0" dirty="0" smtClean="0"/>
+              <a:t> </a:t>
+            </a:r>
+            <a:r>
+              <a:rPr lang="en-US" baseline="0" dirty="0" err="1" smtClean="0"/>
+              <a:t>akceptor</a:t>
+            </a:r>
+            <a:r>
+              <a:rPr lang="en-US" baseline="0" dirty="0" smtClean="0"/>
+              <a:t> </a:t>
+            </a:r>
+            <a:r>
+              <a:rPr lang="en-US" baseline="0" dirty="0" err="1" smtClean="0"/>
+              <a:t>vytvorime</a:t>
+            </a:r>
+            <a:r>
+              <a:rPr lang="en-US" baseline="0" dirty="0" smtClean="0"/>
+              <a:t> </a:t>
+            </a:r>
+            <a:r>
+              <a:rPr lang="en-US" baseline="0" dirty="0" err="1" smtClean="0"/>
+              <a:t>pomocou</a:t>
+            </a:r>
+            <a:r>
+              <a:rPr lang="en-US" baseline="0" dirty="0" smtClean="0"/>
+              <a:t> </a:t>
+            </a:r>
+            <a:r>
+              <a:rPr lang="en-US" baseline="0" dirty="0" err="1" smtClean="0"/>
+              <a:t>Thompsonovho</a:t>
+            </a:r>
+            <a:r>
+              <a:rPr lang="en-US" baseline="0" dirty="0" smtClean="0"/>
+              <a:t> </a:t>
+            </a:r>
+            <a:r>
+              <a:rPr lang="en-US" baseline="0" dirty="0" err="1" smtClean="0"/>
+              <a:t>konstrukcneho</a:t>
+            </a:r>
+            <a:r>
+              <a:rPr lang="en-US" baseline="0" dirty="0" smtClean="0"/>
+              <a:t> </a:t>
+            </a:r>
+            <a:r>
+              <a:rPr lang="en-US" baseline="0" dirty="0" err="1" smtClean="0"/>
+              <a:t>algoritmu</a:t>
+            </a:r>
+            <a:r>
+              <a:rPr lang="en-US" baseline="0" dirty="0" smtClean="0"/>
+              <a:t>, on </a:t>
+            </a:r>
+            <a:r>
+              <a:rPr lang="en-US" baseline="0" dirty="0" err="1" smtClean="0"/>
+              <a:t>vytvori</a:t>
+            </a:r>
+            <a:r>
+              <a:rPr lang="en-US" baseline="0" dirty="0" smtClean="0"/>
+              <a:t> </a:t>
+            </a:r>
+            <a:r>
+              <a:rPr lang="en-US" baseline="0" dirty="0" err="1" smtClean="0"/>
+              <a:t>nedeterministicku</a:t>
+            </a:r>
+            <a:r>
+              <a:rPr lang="en-US" baseline="0" dirty="0" smtClean="0"/>
+              <a:t> </a:t>
+            </a:r>
+            <a:r>
+              <a:rPr lang="en-US" baseline="0" dirty="0" err="1" smtClean="0"/>
+              <a:t>formu</a:t>
+            </a:r>
+            <a:r>
+              <a:rPr lang="en-US" baseline="0" dirty="0" smtClean="0"/>
+              <a:t> </a:t>
+            </a:r>
+            <a:r>
+              <a:rPr lang="en-US" baseline="0" dirty="0" err="1" smtClean="0"/>
+              <a:t>akceptora</a:t>
+            </a:r>
+            <a:r>
+              <a:rPr lang="en-US" baseline="0" dirty="0" smtClean="0"/>
+              <a:t>, a </a:t>
+            </a:r>
+            <a:r>
+              <a:rPr lang="en-US" baseline="0" dirty="0" err="1" smtClean="0"/>
+              <a:t>teda</a:t>
+            </a:r>
+            <a:r>
+              <a:rPr lang="en-US" baseline="0" dirty="0" smtClean="0"/>
+              <a:t> </a:t>
+            </a:r>
+            <a:r>
+              <a:rPr lang="en-US" baseline="0" dirty="0" err="1" smtClean="0"/>
+              <a:t>sa</a:t>
+            </a:r>
+            <a:r>
+              <a:rPr lang="en-US" baseline="0" dirty="0" smtClean="0"/>
+              <a:t> </a:t>
+            </a:r>
+            <a:r>
+              <a:rPr lang="en-US" baseline="0" dirty="0" err="1" smtClean="0"/>
+              <a:t>moze</a:t>
+            </a:r>
+            <a:r>
+              <a:rPr lang="en-US" baseline="0" dirty="0" smtClean="0"/>
+              <a:t> </a:t>
+            </a:r>
+            <a:r>
+              <a:rPr lang="en-US" baseline="0" dirty="0" err="1" smtClean="0"/>
+              <a:t>dostat</a:t>
+            </a:r>
+            <a:r>
+              <a:rPr lang="en-US" baseline="0" dirty="0" smtClean="0"/>
+              <a:t> do </a:t>
+            </a:r>
+            <a:r>
+              <a:rPr lang="en-US" baseline="0" dirty="0" err="1" smtClean="0"/>
+              <a:t>dvoch</a:t>
+            </a:r>
+            <a:r>
+              <a:rPr lang="en-US" baseline="0" dirty="0" smtClean="0"/>
+              <a:t> </a:t>
+            </a:r>
+            <a:r>
+              <a:rPr lang="en-US" baseline="0" dirty="0" err="1" smtClean="0"/>
+              <a:t>stavov</a:t>
+            </a:r>
+            <a:r>
+              <a:rPr lang="en-US" baseline="0" dirty="0" smtClean="0"/>
+              <a:t> </a:t>
+            </a:r>
+            <a:r>
+              <a:rPr lang="en-US" baseline="0" dirty="0" err="1" smtClean="0"/>
+              <a:t>naraz</a:t>
+            </a:r>
+            <a:r>
+              <a:rPr lang="en-US" baseline="0" dirty="0" smtClean="0"/>
+              <a:t>, to je </a:t>
+            </a:r>
+            <a:r>
+              <a:rPr lang="en-US" baseline="0" dirty="0" err="1" smtClean="0"/>
+              <a:t>vyhodne</a:t>
+            </a:r>
+            <a:r>
+              <a:rPr lang="en-US" baseline="0" dirty="0" smtClean="0"/>
+              <a:t> pre </a:t>
+            </a:r>
+            <a:r>
+              <a:rPr lang="en-US" baseline="0" dirty="0" err="1" smtClean="0"/>
+              <a:t>spracovanie</a:t>
+            </a:r>
+            <a:r>
+              <a:rPr lang="en-US" baseline="0" dirty="0" smtClean="0"/>
+              <a:t> </a:t>
+            </a:r>
+            <a:r>
+              <a:rPr lang="en-US" baseline="0" dirty="0" err="1" smtClean="0"/>
+              <a:t>pocitacom</a:t>
+            </a:r>
+            <a:r>
+              <a:rPr lang="en-US" baseline="0" dirty="0" smtClean="0"/>
+              <a:t>, </a:t>
+            </a:r>
+            <a:r>
+              <a:rPr lang="en-US" baseline="0" dirty="0" err="1" smtClean="0"/>
+              <a:t>kedze</a:t>
+            </a:r>
+            <a:r>
+              <a:rPr lang="en-US" baseline="0" dirty="0" smtClean="0"/>
+              <a:t> je </a:t>
+            </a:r>
+            <a:r>
+              <a:rPr lang="en-US" baseline="0" dirty="0" err="1" smtClean="0"/>
+              <a:t>mozne</a:t>
+            </a:r>
+            <a:r>
+              <a:rPr lang="en-US" baseline="0" dirty="0" smtClean="0"/>
+              <a:t> </a:t>
+            </a:r>
+            <a:r>
+              <a:rPr lang="en-US" baseline="0" dirty="0" err="1" smtClean="0"/>
+              <a:t>vyuzit</a:t>
+            </a:r>
+            <a:r>
+              <a:rPr lang="en-US" baseline="0" dirty="0" smtClean="0"/>
+              <a:t> </a:t>
+            </a:r>
+            <a:r>
+              <a:rPr lang="en-US" baseline="0" dirty="0" err="1" smtClean="0"/>
+              <a:t>rekurziu</a:t>
+            </a:r>
+            <a:r>
+              <a:rPr lang="en-US" baseline="0" dirty="0" smtClean="0"/>
+              <a:t>.</a:t>
+            </a:r>
+            <a:endParaRPr lang="en-US" dirty="0"/>
+          </a:p>
+        </p:txBody>
+      </p:sp>
+      <p:sp>
+        <p:nvSpPr>
+          <p:cNvPr id="4" name="Slide Number Placeholder 3"/>
+          <p:cNvSpPr>
+            <a:spLocks noGrp="1"/>
+          </p:cNvSpPr>
+          <p:nvPr>
+            <p:ph type="sldNum" sz="quarter" idx="10"/>
+          </p:nvPr>
+        </p:nvSpPr>
+        <p:spPr/>
+        <p:txBody>
+          <a:bodyPr/>
+          <a:lstStyle/>
+          <a:p>
+            <a:fld id="{8A2CF31D-19BA-0D49-9C18-D660A2246B72}" type="slidenum">
+              <a:rPr lang="en-US" smtClean="0"/>
+              <a:t>7</a:t>
+            </a:fld>
+            <a:endParaRPr lang="en-US"/>
+          </a:p>
+        </p:txBody>
+      </p:sp>
+    </p:spTree>
+    <p:extLst>
+      <p:ext uri="{BB962C8B-B14F-4D97-AF65-F5344CB8AC3E}">
+        <p14:creationId xmlns:p14="http://schemas.microsoft.com/office/powerpoint/2010/main" val="1116047133"/>
+      </p:ext>
+    </p:extLst>
+  </p:cSld>
+  <p:clrMapOvr>
+    <a:masterClrMapping/>
+  </p:clrMapOvr>
+</p:notes>
+</file>
+
+<file path=ppt/notesSlides/notesSlide8.xml><?xml version="1.0" encoding="utf-8"?>
+<p:notes xmlns:a="http://schemas.openxmlformats.org/drawingml/2006/main" xmlns:r="http://schemas.openxmlformats.org/officeDocument/2006/relationships" xmlns:p="http://schemas.openxmlformats.org/presentationml/2006/main">
+  <p:cSld>
+    <p:spTree>
+      <p:nvGrpSpPr>
+        <p:cNvPr id="1" name=""/>
+        <p:cNvGrpSpPr/>
+        <p:nvPr/>
+      </p:nvGrpSpPr>
+      <p:grpSpPr>
+        <a:xfrm>
+          <a:off x="0" y="0"/>
+          <a:ext cx="0" cy="0"/>
+          <a:chOff x="0" y="0"/>
+          <a:chExt cx="0" cy="0"/>
+        </a:xfrm>
+      </p:grpSpPr>
+      <p:sp>
+        <p:nvSpPr>
+          <p:cNvPr id="2" name="Slide Image Placeholder 1"/>
+          <p:cNvSpPr>
+            <a:spLocks noGrp="1" noRot="1" noChangeAspect="1"/>
+          </p:cNvSpPr>
+          <p:nvPr>
+            <p:ph type="sldImg"/>
+          </p:nvPr>
+        </p:nvSpPr>
+        <p:spPr/>
+      </p:sp>
+      <p:sp>
+        <p:nvSpPr>
+          <p:cNvPr id="3" name="Notes Placeholder 2"/>
+          <p:cNvSpPr>
+            <a:spLocks noGrp="1"/>
+          </p:cNvSpPr>
+          <p:nvPr>
+            <p:ph type="body" idx="1"/>
+          </p:nvPr>
+        </p:nvSpPr>
+        <p:spPr/>
+        <p:txBody>
+          <a:bodyPr/>
+          <a:lstStyle/>
+          <a:p>
+            <a:r>
+              <a:rPr lang="en-US" dirty="0" err="1" smtClean="0"/>
               <a:t>Možný</a:t>
             </a:r>
             <a:r>
@@ -1423,7 +4561,7 @@
 </p:notes>
 </file>
 
-<file path=ppt/notesSlides/notesSlide5.xml><?xml version="1.0" encoding="utf-8"?>
+<file path=ppt/notesSlides/notesSlide9.xml><?xml version="1.0" encoding="utf-8"?>
 <p:notes xmlns:a="http://schemas.openxmlformats.org/drawingml/2006/main" xmlns:r="http://schemas.openxmlformats.org/officeDocument/2006/relationships" xmlns:p="http://schemas.openxmlformats.org/presentationml/2006/main">
   <p:cSld>
     <p:spTree>
@@ -5274,7 +8412,7 @@
           </p:nvPr>
         </p:nvPicPr>
         <p:blipFill>
-          <a:blip r:embed="rId2">
+          <a:blip r:embed="rId3">
             <a:extLst>
               <a:ext uri="{28A0092B-C50C-407E-A947-70E740481C1C}">
                 <a14:useLocalDpi xmlns:a14="http://schemas.microsoft.com/office/drawing/2010/main" val="0"/>
@@ -5497,7 +8635,7 @@
           </p:nvPr>
         </p:nvPicPr>
         <p:blipFill>
-          <a:blip r:embed="rId2">
+          <a:blip r:embed="rId3">
             <a:extLst>
               <a:ext uri="{28A0092B-C50C-407E-A947-70E740481C1C}">
                 <a14:useLocalDpi xmlns:a14="http://schemas.microsoft.com/office/drawing/2010/main" val="0"/>
@@ -5631,7 +8769,7 @@
           </p:nvPr>
         </p:nvPicPr>
         <p:blipFill rotWithShape="1">
-          <a:blip r:embed="rId2">
+          <a:blip r:embed="rId3">
             <a:extLst>
               <a:ext uri="{28A0092B-C50C-407E-A947-70E740481C1C}">
                 <a14:useLocalDpi xmlns:a14="http://schemas.microsoft.com/office/drawing/2010/main" val="0"/>
@@ -5704,7 +8842,7 @@
           <p:nvPr/>
         </p:nvPicPr>
         <p:blipFill>
-          <a:blip r:embed="rId3">
+          <a:blip r:embed="rId4">
             <a:extLst>
               <a:ext uri="{28A0092B-C50C-407E-A947-70E740481C1C}">
                 <a14:useLocalDpi xmlns:a14="http://schemas.microsoft.com/office/drawing/2010/main" val="0"/>
@@ -5734,7 +8872,7 @@
           <p:nvPr/>
         </p:nvPicPr>
         <p:blipFill>
-          <a:blip r:embed="rId4">
+          <a:blip r:embed="rId5">
             <a:extLst>
               <a:ext uri="{28A0092B-C50C-407E-A947-70E740481C1C}">
                 <a14:useLocalDpi xmlns:a14="http://schemas.microsoft.com/office/drawing/2010/main" val="0"/>
@@ -6482,7 +9620,7 @@
           <p:nvPr/>
         </p:nvPicPr>
         <p:blipFill>
-          <a:blip r:embed="rId2">
+          <a:blip r:embed="rId3">
             <a:extLst>
               <a:ext uri="{28A0092B-C50C-407E-A947-70E740481C1C}">
                 <a14:useLocalDpi xmlns:a14="http://schemas.microsoft.com/office/drawing/2010/main" val="0"/>
@@ -7224,7 +10362,7 @@
         <p:spPr>
           <a:xfrm>
             <a:off x="659163" y="1854891"/>
-            <a:ext cx="7884115" cy="3385542"/>
+            <a:ext cx="7884115" cy="2831544"/>
           </a:xfrm>
           <a:prstGeom prst="rect">
             <a:avLst/>
@@ -7250,7 +10388,11 @@
             </a:r>
             <a:r>
               <a:rPr lang="en-US" sz="2400" dirty="0" smtClean="0"/>
-              <a:t>-u</a:t>
+              <a:t>-a/-</a:t>
+            </a:r>
+            <a:r>
+              <a:rPr lang="en-US" sz="2400" dirty="0" err="1" smtClean="0"/>
+              <a:t>ov</a:t>
             </a:r>
             <a:endParaRPr lang="en-US" sz="2400" dirty="0" smtClean="0"/>
           </a:p>
@@ -7350,16 +10492,6 @@
               <a:rPr lang="en-US" sz="2400" dirty="0" err="1" smtClean="0"/>
               <a:t>systému</a:t>
             </a:r>
-            <a:endParaRPr lang="en-US" sz="2400" dirty="0" smtClean="0"/>
-          </a:p>
-          <a:p>
-            <a:pPr marL="285750" indent="-285750">
-              <a:lnSpc>
-                <a:spcPct val="150000"/>
-              </a:lnSpc>
-              <a:buFont typeface="Arial"/>
-              <a:buChar char="•"/>
-            </a:pPr>
             <a:endParaRPr lang="en-US" sz="2400" dirty="0" smtClean="0"/>
           </a:p>
         </p:txBody>

</xml_diff>